<commit_message>
Modify exp code of gain-only version
</commit_message>
<xml_diff>
--- a/gain-only-pilot/code/experiment/Instructions.pptx
+++ b/gain-only-pilot/code/experiment/Instructions.pptx
@@ -5,7 +5,7 @@
     <p:sldMasterId id="2147483648" r:id="rId1"/>
   </p:sldMasterIdLst>
   <p:notesMasterIdLst>
-    <p:notesMasterId r:id="rId16"/>
+    <p:notesMasterId r:id="rId13"/>
   </p:notesMasterIdLst>
   <p:sldIdLst>
     <p:sldId id="278" r:id="rId2"/>
@@ -17,11 +17,8 @@
     <p:sldId id="311" r:id="rId8"/>
     <p:sldId id="324" r:id="rId9"/>
     <p:sldId id="318" r:id="rId10"/>
-    <p:sldId id="323" r:id="rId11"/>
-    <p:sldId id="321" r:id="rId12"/>
-    <p:sldId id="316" r:id="rId13"/>
-    <p:sldId id="319" r:id="rId14"/>
-    <p:sldId id="286" r:id="rId15"/>
+    <p:sldId id="321" r:id="rId11"/>
+    <p:sldId id="286" r:id="rId12"/>
   </p:sldIdLst>
   <p:sldSz cx="9144000" cy="6858000" type="screen4x3"/>
   <p:notesSz cx="6858000" cy="9144000"/>
@@ -227,7 +224,7 @@
           <a:p>
             <a:fld id="{DE0D2635-BDFF-FC4B-BBDA-1B5475F6174E}" type="datetimeFigureOut">
               <a:rPr lang="en-US" smtClean="0"/>
-              <a:t>9/2/22</a:t>
+              <a:t>9/7/22</a:t>
             </a:fld>
             <a:endParaRPr lang="en-US"/>
           </a:p>
@@ -757,7 +754,7 @@
           <a:p>
             <a:fld id="{7212EF1E-2CB8-C54B-94EB-0C51FB85BFE6}" type="datetimeFigureOut">
               <a:rPr lang="en-US" smtClean="0"/>
-              <a:t>9/2/22</a:t>
+              <a:t>9/7/22</a:t>
             </a:fld>
             <a:endParaRPr lang="en-US"/>
           </a:p>
@@ -925,7 +922,7 @@
           <a:p>
             <a:fld id="{7212EF1E-2CB8-C54B-94EB-0C51FB85BFE6}" type="datetimeFigureOut">
               <a:rPr lang="en-US" smtClean="0"/>
-              <a:t>9/2/22</a:t>
+              <a:t>9/7/22</a:t>
             </a:fld>
             <a:endParaRPr lang="en-US"/>
           </a:p>
@@ -1103,7 +1100,7 @@
           <a:p>
             <a:fld id="{7212EF1E-2CB8-C54B-94EB-0C51FB85BFE6}" type="datetimeFigureOut">
               <a:rPr lang="en-US" smtClean="0"/>
-              <a:t>9/2/22</a:t>
+              <a:t>9/7/22</a:t>
             </a:fld>
             <a:endParaRPr lang="en-US"/>
           </a:p>
@@ -1271,7 +1268,7 @@
           <a:p>
             <a:fld id="{7212EF1E-2CB8-C54B-94EB-0C51FB85BFE6}" type="datetimeFigureOut">
               <a:rPr lang="en-US" smtClean="0"/>
-              <a:t>9/2/22</a:t>
+              <a:t>9/7/22</a:t>
             </a:fld>
             <a:endParaRPr lang="en-US"/>
           </a:p>
@@ -1516,7 +1513,7 @@
           <a:p>
             <a:fld id="{7212EF1E-2CB8-C54B-94EB-0C51FB85BFE6}" type="datetimeFigureOut">
               <a:rPr lang="en-US" smtClean="0"/>
-              <a:t>9/2/22</a:t>
+              <a:t>9/7/22</a:t>
             </a:fld>
             <a:endParaRPr lang="en-US"/>
           </a:p>
@@ -1801,7 +1798,7 @@
           <a:p>
             <a:fld id="{7212EF1E-2CB8-C54B-94EB-0C51FB85BFE6}" type="datetimeFigureOut">
               <a:rPr lang="en-US" smtClean="0"/>
-              <a:t>9/2/22</a:t>
+              <a:t>9/7/22</a:t>
             </a:fld>
             <a:endParaRPr lang="en-US"/>
           </a:p>
@@ -2220,7 +2217,7 @@
           <a:p>
             <a:fld id="{7212EF1E-2CB8-C54B-94EB-0C51FB85BFE6}" type="datetimeFigureOut">
               <a:rPr lang="en-US" smtClean="0"/>
-              <a:t>9/2/22</a:t>
+              <a:t>9/7/22</a:t>
             </a:fld>
             <a:endParaRPr lang="en-US"/>
           </a:p>
@@ -2337,7 +2334,7 @@
           <a:p>
             <a:fld id="{7212EF1E-2CB8-C54B-94EB-0C51FB85BFE6}" type="datetimeFigureOut">
               <a:rPr lang="en-US" smtClean="0"/>
-              <a:t>9/2/22</a:t>
+              <a:t>9/7/22</a:t>
             </a:fld>
             <a:endParaRPr lang="en-US"/>
           </a:p>
@@ -2432,7 +2429,7 @@
           <a:p>
             <a:fld id="{7212EF1E-2CB8-C54B-94EB-0C51FB85BFE6}" type="datetimeFigureOut">
               <a:rPr lang="en-US" smtClean="0"/>
-              <a:t>9/2/22</a:t>
+              <a:t>9/7/22</a:t>
             </a:fld>
             <a:endParaRPr lang="en-US"/>
           </a:p>
@@ -2707,7 +2704,7 @@
           <a:p>
             <a:fld id="{7212EF1E-2CB8-C54B-94EB-0C51FB85BFE6}" type="datetimeFigureOut">
               <a:rPr lang="en-US" smtClean="0"/>
-              <a:t>9/2/22</a:t>
+              <a:t>9/7/22</a:t>
             </a:fld>
             <a:endParaRPr lang="en-US"/>
           </a:p>
@@ -2959,7 +2956,7 @@
           <a:p>
             <a:fld id="{7212EF1E-2CB8-C54B-94EB-0C51FB85BFE6}" type="datetimeFigureOut">
               <a:rPr lang="en-US" smtClean="0"/>
-              <a:t>9/2/22</a:t>
+              <a:t>9/7/22</a:t>
             </a:fld>
             <a:endParaRPr lang="en-US"/>
           </a:p>
@@ -3170,7 +3167,7 @@
           <a:p>
             <a:fld id="{7212EF1E-2CB8-C54B-94EB-0C51FB85BFE6}" type="datetimeFigureOut">
               <a:rPr lang="en-US" smtClean="0"/>
-              <a:t>9/2/22</a:t>
+              <a:t>9/7/22</a:t>
             </a:fld>
             <a:endParaRPr lang="en-US"/>
           </a:p>
@@ -3596,7 +3593,21 @@
                 <a:latin typeface="Times New Roman" panose="02020603050405020304" pitchFamily="18" charset="0"/>
                 <a:cs typeface="Times New Roman" panose="02020603050405020304" pitchFamily="18" charset="0"/>
               </a:rPr>
-              <a:t>This research project is conducted at Ghent University and Université libre de Bruxelles. In this experiment, you will play a simple decision-making game. The data we collect during the experiment are not linked to any potentially identifying information. These data will solely be used for research purposes. </a:t>
+              <a:t>This research project is conducted at Université libre de </a:t>
+            </a:r>
+            <a:r>
+              <a:rPr lang="en-US" dirty="0" err="1">
+                <a:latin typeface="Times New Roman" panose="02020603050405020304" pitchFamily="18" charset="0"/>
+                <a:cs typeface="Times New Roman" panose="02020603050405020304" pitchFamily="18" charset="0"/>
+              </a:rPr>
+              <a:t>Bruxelles</a:t>
+            </a:r>
+            <a:r>
+              <a:rPr lang="en-US" dirty="0">
+                <a:latin typeface="Times New Roman" panose="02020603050405020304" pitchFamily="18" charset="0"/>
+                <a:cs typeface="Times New Roman" panose="02020603050405020304" pitchFamily="18" charset="0"/>
+              </a:rPr>
+              <a:t> and Ghent University. In this experiment, you will play a simple decision-making game. The data we collect during the experiment are not linked to any potentially identifying information. These data will solely be used for research purposes. </a:t>
             </a:r>
             <a:r>
               <a:rPr lang="en-GB" dirty="0">
@@ -3624,30 +3635,44 @@
                 <a:latin typeface="Times New Roman" panose="02020603050405020304" pitchFamily="18" charset="0"/>
                 <a:cs typeface="Times New Roman" panose="02020603050405020304" pitchFamily="18" charset="0"/>
               </a:rPr>
-              <a:t> If you have any questions, you can contact Zhang Chen at </a:t>
+              <a:t> If you have any questions, you can contact </a:t>
+            </a:r>
+            <a:r>
+              <a:rPr lang="en-US" dirty="0" err="1">
+                <a:latin typeface="Times New Roman" panose="02020603050405020304" pitchFamily="18" charset="0"/>
+                <a:cs typeface="Times New Roman" panose="02020603050405020304" pitchFamily="18" charset="0"/>
+              </a:rPr>
+              <a:t>Nilosmita</a:t>
             </a:r>
             <a:r>
               <a:rPr lang="en-US" dirty="0">
                 <a:latin typeface="Times New Roman" panose="02020603050405020304" pitchFamily="18" charset="0"/>
                 <a:cs typeface="Times New Roman" panose="02020603050405020304" pitchFamily="18" charset="0"/>
+              </a:rPr>
+              <a:t> Banerjee at  </a:t>
+            </a:r>
+            <a:r>
+              <a:rPr lang="en-US" dirty="0">
+                <a:latin typeface="Times New Roman" panose="02020603050405020304" pitchFamily="18" charset="0"/>
+                <a:cs typeface="Times New Roman" panose="02020603050405020304" pitchFamily="18" charset="0"/>
                 <a:hlinkClick r:id="rId2"/>
               </a:rPr>
+              <a:t>nilosmita.banerjee@ulb.be</a:t>
+            </a:r>
+            <a:r>
+              <a:rPr lang="en-US" dirty="0">
+                <a:latin typeface="Times New Roman" panose="02020603050405020304" pitchFamily="18" charset="0"/>
+                <a:cs typeface="Times New Roman" panose="02020603050405020304" pitchFamily="18" charset="0"/>
+              </a:rPr>
+              <a:t> and/or Zhang Chen at </a:t>
+            </a:r>
+            <a:r>
+              <a:rPr lang="en-US" dirty="0">
+                <a:latin typeface="Times New Roman" panose="02020603050405020304" pitchFamily="18" charset="0"/>
+                <a:cs typeface="Times New Roman" panose="02020603050405020304" pitchFamily="18" charset="0"/>
+                <a:hlinkClick r:id="rId3"/>
+              </a:rPr>
               <a:t>zhang.chen@ugent.be</a:t>
-            </a:r>
-            <a:r>
-              <a:rPr lang="en-US" dirty="0">
-                <a:latin typeface="Times New Roman" panose="02020603050405020304" pitchFamily="18" charset="0"/>
-                <a:cs typeface="Times New Roman" panose="02020603050405020304" pitchFamily="18" charset="0"/>
-              </a:rPr>
-              <a:t> and/or Nilosmita Banerjee at </a:t>
-            </a:r>
-            <a:r>
-              <a:rPr lang="en-US" dirty="0">
-                <a:latin typeface="Times New Roman" panose="02020603050405020304" pitchFamily="18" charset="0"/>
-                <a:cs typeface="Times New Roman" panose="02020603050405020304" pitchFamily="18" charset="0"/>
-                <a:hlinkClick r:id="rId3"/>
-              </a:rPr>
-              <a:t>nilosmita.banerjee@ulb.be</a:t>
             </a:r>
             <a:r>
               <a:rPr lang="en-US" dirty="0">
@@ -3690,152 +3715,6 @@
 </file>
 
 <file path=ppt/slides/slide10.xml><?xml version="1.0" encoding="utf-8"?>
-<p:sld xmlns:a="http://schemas.openxmlformats.org/drawingml/2006/main" xmlns:r="http://schemas.openxmlformats.org/officeDocument/2006/relationships" xmlns:p="http://schemas.openxmlformats.org/presentationml/2006/main">
-  <p:cSld>
-    <p:spTree>
-      <p:nvGrpSpPr>
-        <p:cNvPr id="1" name=""/>
-        <p:cNvGrpSpPr/>
-        <p:nvPr/>
-      </p:nvGrpSpPr>
-      <p:grpSpPr>
-        <a:xfrm>
-          <a:off x="0" y="0"/>
-          <a:ext cx="0" cy="0"/>
-          <a:chOff x="0" y="0"/>
-          <a:chExt cx="0" cy="0"/>
-        </a:xfrm>
-      </p:grpSpPr>
-      <p:pic>
-        <p:nvPicPr>
-          <p:cNvPr id="3" name="Picture 2" descr="Graphical user interface, application&#10;&#10;Description automatically generated">
-            <a:extLst>
-              <a:ext uri="{FF2B5EF4-FFF2-40B4-BE49-F238E27FC236}">
-                <a16:creationId xmlns:a16="http://schemas.microsoft.com/office/drawing/2014/main" id="{6220ECBD-88F4-4BB6-A80A-29D2A157D091}"/>
-              </a:ext>
-            </a:extLst>
-          </p:cNvPr>
-          <p:cNvPicPr>
-            <a:picLocks noChangeAspect="1"/>
-          </p:cNvPicPr>
-          <p:nvPr/>
-        </p:nvPicPr>
-        <p:blipFill>
-          <a:blip r:embed="rId2"/>
-          <a:stretch>
-            <a:fillRect/>
-          </a:stretch>
-        </p:blipFill>
-        <p:spPr>
-          <a:xfrm>
-            <a:off x="2603500" y="632239"/>
-            <a:ext cx="3937000" cy="1803400"/>
-          </a:xfrm>
-          <a:prstGeom prst="rect">
-            <a:avLst/>
-          </a:prstGeom>
-          <a:ln w="25400">
-            <a:solidFill>
-              <a:schemeClr val="tx1"/>
-            </a:solidFill>
-          </a:ln>
-        </p:spPr>
-      </p:pic>
-      <p:sp>
-        <p:nvSpPr>
-          <p:cNvPr id="4" name="TextBox 3">
-            <a:extLst>
-              <a:ext uri="{FF2B5EF4-FFF2-40B4-BE49-F238E27FC236}">
-                <a16:creationId xmlns:a16="http://schemas.microsoft.com/office/drawing/2014/main" id="{488853E7-71EB-9638-27FC-1F1BE5858164}"/>
-              </a:ext>
-            </a:extLst>
-          </p:cNvPr>
-          <p:cNvSpPr txBox="1"/>
-          <p:nvPr/>
-        </p:nvSpPr>
-        <p:spPr>
-          <a:xfrm>
-            <a:off x="529119" y="3429000"/>
-            <a:ext cx="8085762" cy="1477328"/>
-          </a:xfrm>
-          <a:prstGeom prst="rect">
-            <a:avLst/>
-          </a:prstGeom>
-          <a:noFill/>
-        </p:spPr>
-        <p:txBody>
-          <a:bodyPr wrap="square" rtlCol="0">
-            <a:spAutoFit/>
-          </a:bodyPr>
-          <a:lstStyle/>
-          <a:p>
-            <a:pPr algn="just"/>
-            <a:r>
-              <a:rPr lang="en-US" dirty="0">
-                <a:latin typeface="Times New Roman" panose="02020603050405020304" pitchFamily="18" charset="0"/>
-                <a:cs typeface="Times New Roman" panose="02020603050405020304" pitchFamily="18" charset="0"/>
-              </a:rPr>
-              <a:t>After you have seen both the win and loss amount, </a:t>
-            </a:r>
-            <a:r>
-              <a:rPr lang="en-US" b="1" dirty="0">
-                <a:latin typeface="Times New Roman" panose="02020603050405020304" pitchFamily="18" charset="0"/>
-                <a:cs typeface="Times New Roman" panose="02020603050405020304" pitchFamily="18" charset="0"/>
-              </a:rPr>
-              <a:t>two choice options</a:t>
-            </a:r>
-            <a:r>
-              <a:rPr lang="en-US" dirty="0">
-                <a:latin typeface="Times New Roman" panose="02020603050405020304" pitchFamily="18" charset="0"/>
-                <a:cs typeface="Times New Roman" panose="02020603050405020304" pitchFamily="18" charset="0"/>
-              </a:rPr>
-              <a:t> will appear on screen (see above). Note that you can continue checking the win and loss amount, if you have not made up your mind yet. You need to decide whether you want to play the current game. If you want to play it, </a:t>
-            </a:r>
-            <a:r>
-              <a:rPr lang="en-US" b="1" dirty="0">
-                <a:latin typeface="Times New Roman" panose="02020603050405020304" pitchFamily="18" charset="0"/>
-                <a:cs typeface="Times New Roman" panose="02020603050405020304" pitchFamily="18" charset="0"/>
-              </a:rPr>
-              <a:t>click on Accept</a:t>
-            </a:r>
-            <a:r>
-              <a:rPr lang="en-US" dirty="0">
-                <a:latin typeface="Times New Roman" panose="02020603050405020304" pitchFamily="18" charset="0"/>
-                <a:cs typeface="Times New Roman" panose="02020603050405020304" pitchFamily="18" charset="0"/>
-              </a:rPr>
-              <a:t>. If you do not want to play, </a:t>
-            </a:r>
-            <a:r>
-              <a:rPr lang="en-US" b="1" dirty="0">
-                <a:latin typeface="Times New Roman" panose="02020603050405020304" pitchFamily="18" charset="0"/>
-                <a:cs typeface="Times New Roman" panose="02020603050405020304" pitchFamily="18" charset="0"/>
-              </a:rPr>
-              <a:t>click on Reject</a:t>
-            </a:r>
-            <a:r>
-              <a:rPr lang="en-US" dirty="0">
-                <a:latin typeface="Times New Roman" panose="02020603050405020304" pitchFamily="18" charset="0"/>
-                <a:cs typeface="Times New Roman" panose="02020603050405020304" pitchFamily="18" charset="0"/>
-              </a:rPr>
-              <a:t>.</a:t>
-            </a:r>
-          </a:p>
-        </p:txBody>
-      </p:sp>
-    </p:spTree>
-    <p:extLst>
-      <p:ext uri="{BB962C8B-B14F-4D97-AF65-F5344CB8AC3E}">
-        <p14:creationId xmlns:p14="http://schemas.microsoft.com/office/powerpoint/2010/main" val="3119774031"/>
-      </p:ext>
-    </p:extLst>
-  </p:cSld>
-  <p:clrMapOvr>
-    <a:masterClrMapping/>
-  </p:clrMapOvr>
-</p:sld>
-</file>
-
-<file path=ppt/slides/slide11.xml><?xml version="1.0" encoding="utf-8"?>
 <p:sld xmlns:a="http://schemas.openxmlformats.org/drawingml/2006/main" xmlns:r="http://schemas.openxmlformats.org/officeDocument/2006/relationships" xmlns:p="http://schemas.openxmlformats.org/presentationml/2006/main">
   <p:cSld>
     <p:spTree>
@@ -4149,300 +4028,7 @@
 </p:sld>
 </file>
 
-<file path=ppt/slides/slide12.xml><?xml version="1.0" encoding="utf-8"?>
-<p:sld xmlns:a="http://schemas.openxmlformats.org/drawingml/2006/main" xmlns:r="http://schemas.openxmlformats.org/officeDocument/2006/relationships" xmlns:p="http://schemas.openxmlformats.org/presentationml/2006/main">
-  <p:cSld>
-    <p:spTree>
-      <p:nvGrpSpPr>
-        <p:cNvPr id="1" name=""/>
-        <p:cNvGrpSpPr/>
-        <p:nvPr/>
-      </p:nvGrpSpPr>
-      <p:grpSpPr>
-        <a:xfrm>
-          <a:off x="0" y="0"/>
-          <a:ext cx="0" cy="0"/>
-          <a:chOff x="0" y="0"/>
-          <a:chExt cx="0" cy="0"/>
-        </a:xfrm>
-      </p:grpSpPr>
-      <p:pic>
-        <p:nvPicPr>
-          <p:cNvPr id="3" name="Picture 2" descr="Icon&#10;&#10;Description automatically generated">
-            <a:extLst>
-              <a:ext uri="{FF2B5EF4-FFF2-40B4-BE49-F238E27FC236}">
-                <a16:creationId xmlns:a16="http://schemas.microsoft.com/office/drawing/2014/main" id="{27FDE8DA-CDB7-99FD-C197-325FC55B0FBA}"/>
-              </a:ext>
-            </a:extLst>
-          </p:cNvPr>
-          <p:cNvPicPr>
-            <a:picLocks noChangeAspect="1"/>
-          </p:cNvPicPr>
-          <p:nvPr/>
-        </p:nvPicPr>
-        <p:blipFill>
-          <a:blip r:embed="rId2"/>
-          <a:stretch>
-            <a:fillRect/>
-          </a:stretch>
-        </p:blipFill>
-        <p:spPr>
-          <a:xfrm>
-            <a:off x="1093305" y="299279"/>
-            <a:ext cx="2966952" cy="2945055"/>
-          </a:xfrm>
-          <a:prstGeom prst="rect">
-            <a:avLst/>
-          </a:prstGeom>
-        </p:spPr>
-      </p:pic>
-      <p:pic>
-        <p:nvPicPr>
-          <p:cNvPr id="5" name="Picture 4" descr="A picture containing icon&#10;&#10;Description automatically generated">
-            <a:extLst>
-              <a:ext uri="{FF2B5EF4-FFF2-40B4-BE49-F238E27FC236}">
-                <a16:creationId xmlns:a16="http://schemas.microsoft.com/office/drawing/2014/main" id="{C63F7DC9-55D2-6A8E-5E31-1E2E2028F640}"/>
-              </a:ext>
-            </a:extLst>
-          </p:cNvPr>
-          <p:cNvPicPr>
-            <a:picLocks noChangeAspect="1"/>
-          </p:cNvPicPr>
-          <p:nvPr/>
-        </p:nvPicPr>
-        <p:blipFill>
-          <a:blip r:embed="rId3"/>
-          <a:stretch>
-            <a:fillRect/>
-          </a:stretch>
-        </p:blipFill>
-        <p:spPr>
-          <a:xfrm>
-            <a:off x="4716824" y="396088"/>
-            <a:ext cx="2966953" cy="2835088"/>
-          </a:xfrm>
-          <a:prstGeom prst="rect">
-            <a:avLst/>
-          </a:prstGeom>
-        </p:spPr>
-      </p:pic>
-      <p:sp>
-        <p:nvSpPr>
-          <p:cNvPr id="6" name="TextBox 5">
-            <a:extLst>
-              <a:ext uri="{FF2B5EF4-FFF2-40B4-BE49-F238E27FC236}">
-                <a16:creationId xmlns:a16="http://schemas.microsoft.com/office/drawing/2014/main" id="{CC2F4F79-4379-DAFB-3B40-B77CE347C98D}"/>
-              </a:ext>
-            </a:extLst>
-          </p:cNvPr>
-          <p:cNvSpPr txBox="1"/>
-          <p:nvPr/>
-        </p:nvSpPr>
-        <p:spPr>
-          <a:xfrm>
-            <a:off x="537426" y="3159105"/>
-            <a:ext cx="8085762" cy="2031325"/>
-          </a:xfrm>
-          <a:prstGeom prst="rect">
-            <a:avLst/>
-          </a:prstGeom>
-          <a:noFill/>
-        </p:spPr>
-        <p:txBody>
-          <a:bodyPr wrap="square" rtlCol="0">
-            <a:spAutoFit/>
-          </a:bodyPr>
-          <a:lstStyle/>
-          <a:p>
-            <a:pPr algn="just"/>
-            <a:r>
-              <a:rPr lang="en-US" dirty="0">
-                <a:latin typeface="Times New Roman" panose="02020603050405020304" pitchFamily="18" charset="0"/>
-                <a:cs typeface="Times New Roman" panose="02020603050405020304" pitchFamily="18" charset="0"/>
-              </a:rPr>
-              <a:t>To see the win  amount, you need to </a:t>
-            </a:r>
-            <a:r>
-              <a:rPr lang="en-US" b="1" dirty="0">
-                <a:latin typeface="Times New Roman" panose="02020603050405020304" pitchFamily="18" charset="0"/>
-                <a:cs typeface="Times New Roman" panose="02020603050405020304" pitchFamily="18" charset="0"/>
-              </a:rPr>
-              <a:t>move the mouse cursor</a:t>
-            </a:r>
-            <a:r>
-              <a:rPr lang="en-US" dirty="0">
-                <a:latin typeface="Times New Roman" panose="02020603050405020304" pitchFamily="18" charset="0"/>
-                <a:cs typeface="Times New Roman" panose="02020603050405020304" pitchFamily="18" charset="0"/>
-              </a:rPr>
-              <a:t> into the green circle. You will see a gray bar, with part of it colored green. The higher the green part, the more money you may win. The total height of the gray bar is 100 pence (1 pound).</a:t>
-            </a:r>
-          </a:p>
-          <a:p>
-            <a:pPr algn="just"/>
-            <a:r>
-              <a:rPr lang="en-US" dirty="0">
-                <a:latin typeface="Times New Roman" panose="02020603050405020304" pitchFamily="18" charset="0"/>
-                <a:cs typeface="Times New Roman" panose="02020603050405020304" pitchFamily="18" charset="0"/>
-              </a:rPr>
-              <a:t> </a:t>
-            </a:r>
-          </a:p>
-          <a:p>
-            <a:pPr algn="just"/>
-            <a:r>
-              <a:rPr lang="en-US" dirty="0">
-                <a:latin typeface="Times New Roman" panose="02020603050405020304" pitchFamily="18" charset="0"/>
-                <a:cs typeface="Times New Roman" panose="02020603050405020304" pitchFamily="18" charset="0"/>
-              </a:rPr>
-              <a:t>Likewise, to see the loss amount, you </a:t>
-            </a:r>
-            <a:r>
-              <a:rPr lang="en-US" b="1" dirty="0">
-                <a:latin typeface="Times New Roman" panose="02020603050405020304" pitchFamily="18" charset="0"/>
-                <a:cs typeface="Times New Roman" panose="02020603050405020304" pitchFamily="18" charset="0"/>
-              </a:rPr>
-              <a:t>move the mouse cursor </a:t>
-            </a:r>
-            <a:r>
-              <a:rPr lang="en-US" dirty="0">
-                <a:latin typeface="Times New Roman" panose="02020603050405020304" pitchFamily="18" charset="0"/>
-                <a:cs typeface="Times New Roman" panose="02020603050405020304" pitchFamily="18" charset="0"/>
-              </a:rPr>
-              <a:t>into the red circle. The higher the red part, the more money you may lose. The total height of the gray bar is 100 pence.</a:t>
-            </a:r>
-          </a:p>
-        </p:txBody>
-      </p:sp>
-    </p:spTree>
-    <p:extLst>
-      <p:ext uri="{BB962C8B-B14F-4D97-AF65-F5344CB8AC3E}">
-        <p14:creationId xmlns:p14="http://schemas.microsoft.com/office/powerpoint/2010/main" val="998195183"/>
-      </p:ext>
-    </p:extLst>
-  </p:cSld>
-  <p:clrMapOvr>
-    <a:masterClrMapping/>
-  </p:clrMapOvr>
-</p:sld>
-</file>
-
-<file path=ppt/slides/slide13.xml><?xml version="1.0" encoding="utf-8"?>
-<p:sld xmlns:a="http://schemas.openxmlformats.org/drawingml/2006/main" xmlns:r="http://schemas.openxmlformats.org/officeDocument/2006/relationships" xmlns:p="http://schemas.openxmlformats.org/presentationml/2006/main">
-  <p:cSld>
-    <p:spTree>
-      <p:nvGrpSpPr>
-        <p:cNvPr id="1" name=""/>
-        <p:cNvGrpSpPr/>
-        <p:nvPr/>
-      </p:nvGrpSpPr>
-      <p:grpSpPr>
-        <a:xfrm>
-          <a:off x="0" y="0"/>
-          <a:ext cx="0" cy="0"/>
-          <a:chOff x="0" y="0"/>
-          <a:chExt cx="0" cy="0"/>
-        </a:xfrm>
-      </p:grpSpPr>
-      <p:sp>
-        <p:nvSpPr>
-          <p:cNvPr id="4" name="TextBox 3">
-            <a:extLst>
-              <a:ext uri="{FF2B5EF4-FFF2-40B4-BE49-F238E27FC236}">
-                <a16:creationId xmlns:a16="http://schemas.microsoft.com/office/drawing/2014/main" id="{488853E7-71EB-9638-27FC-1F1BE5858164}"/>
-              </a:ext>
-            </a:extLst>
-          </p:cNvPr>
-          <p:cNvSpPr txBox="1"/>
-          <p:nvPr/>
-        </p:nvSpPr>
-        <p:spPr>
-          <a:xfrm>
-            <a:off x="529118" y="3715696"/>
-            <a:ext cx="8085762" cy="1754326"/>
-          </a:xfrm>
-          <a:prstGeom prst="rect">
-            <a:avLst/>
-          </a:prstGeom>
-          <a:noFill/>
-        </p:spPr>
-        <p:txBody>
-          <a:bodyPr wrap="square" rtlCol="0">
-            <a:spAutoFit/>
-          </a:bodyPr>
-          <a:lstStyle/>
-          <a:p>
-            <a:pPr algn="just"/>
-            <a:r>
-              <a:rPr lang="en-US" dirty="0">
-                <a:latin typeface="Times New Roman" panose="02020603050405020304" pitchFamily="18" charset="0"/>
-                <a:cs typeface="Times New Roman" panose="02020603050405020304" pitchFamily="18" charset="0"/>
-              </a:rPr>
-              <a:t>If you accept the game, there is a 50% chance of winning and 50% chance of losing. The outcome will be determined by a spinning wheel (see above). If the arrow ends up pointing at green, you win and will get the money in the green bar. If the arrow ends up pointing at red, you lose the money in the red bar.</a:t>
-            </a:r>
-          </a:p>
-          <a:p>
-            <a:pPr algn="just"/>
-            <a:endParaRPr lang="en-US" dirty="0">
-              <a:latin typeface="Times New Roman" panose="02020603050405020304" pitchFamily="18" charset="0"/>
-              <a:cs typeface="Times New Roman" panose="02020603050405020304" pitchFamily="18" charset="0"/>
-            </a:endParaRPr>
-          </a:p>
-          <a:p>
-            <a:pPr algn="just"/>
-            <a:r>
-              <a:rPr lang="en-US" dirty="0">
-                <a:latin typeface="Times New Roman" panose="02020603050405020304" pitchFamily="18" charset="0"/>
-                <a:cs typeface="Times New Roman" panose="02020603050405020304" pitchFamily="18" charset="0"/>
-              </a:rPr>
-              <a:t>If you reject the game, you will not win or lose any money (thus, you get 0).</a:t>
-            </a:r>
-          </a:p>
-        </p:txBody>
-      </p:sp>
-      <p:pic>
-        <p:nvPicPr>
-          <p:cNvPr id="5" name="Picture 4">
-            <a:extLst>
-              <a:ext uri="{FF2B5EF4-FFF2-40B4-BE49-F238E27FC236}">
-                <a16:creationId xmlns:a16="http://schemas.microsoft.com/office/drawing/2014/main" id="{22022D72-42C5-3CC5-F57F-13A7642BED07}"/>
-              </a:ext>
-            </a:extLst>
-          </p:cNvPr>
-          <p:cNvPicPr>
-            <a:picLocks noChangeAspect="1"/>
-          </p:cNvPicPr>
-          <p:nvPr/>
-        </p:nvPicPr>
-        <p:blipFill>
-          <a:blip r:embed="rId2"/>
-          <a:stretch>
-            <a:fillRect/>
-          </a:stretch>
-        </p:blipFill>
-        <p:spPr>
-          <a:xfrm>
-            <a:off x="1754659" y="332133"/>
-            <a:ext cx="5634681" cy="3096867"/>
-          </a:xfrm>
-          <a:prstGeom prst="rect">
-            <a:avLst/>
-          </a:prstGeom>
-        </p:spPr>
-      </p:pic>
-    </p:spTree>
-    <p:extLst>
-      <p:ext uri="{BB962C8B-B14F-4D97-AF65-F5344CB8AC3E}">
-        <p14:creationId xmlns:p14="http://schemas.microsoft.com/office/powerpoint/2010/main" val="3622798747"/>
-      </p:ext>
-    </p:extLst>
-  </p:cSld>
-  <p:clrMapOvr>
-    <a:masterClrMapping/>
-  </p:clrMapOvr>
-</p:sld>
-</file>
-
-<file path=ppt/slides/slide14.xml><?xml version="1.0" encoding="utf-8"?>
+<file path=ppt/slides/slide11.xml><?xml version="1.0" encoding="utf-8"?>
 <p:sld xmlns:a="http://schemas.openxmlformats.org/drawingml/2006/main" xmlns:r="http://schemas.openxmlformats.org/officeDocument/2006/relationships" xmlns:p="http://schemas.openxmlformats.org/presentationml/2006/main">
   <p:cSld>
     <p:spTree>

</xml_diff>

<commit_message>
recent commits to tasks
</commit_message>
<xml_diff>
--- a/gain-only-pilot/code/experiment/Instructions.pptx
+++ b/gain-only-pilot/code/experiment/Instructions.pptx
@@ -5,7 +5,7 @@
     <p:sldMasterId id="2147483648" r:id="rId1"/>
   </p:sldMasterIdLst>
   <p:notesMasterIdLst>
-    <p:notesMasterId r:id="rId13"/>
+    <p:notesMasterId r:id="rId14"/>
   </p:notesMasterIdLst>
   <p:sldIdLst>
     <p:sldId id="278" r:id="rId2"/>
@@ -13,12 +13,13 @@
     <p:sldId id="299" r:id="rId4"/>
     <p:sldId id="317" r:id="rId5"/>
     <p:sldId id="320" r:id="rId6"/>
-    <p:sldId id="322" r:id="rId7"/>
-    <p:sldId id="311" r:id="rId8"/>
-    <p:sldId id="324" r:id="rId9"/>
-    <p:sldId id="318" r:id="rId10"/>
-    <p:sldId id="321" r:id="rId11"/>
-    <p:sldId id="286" r:id="rId12"/>
+    <p:sldId id="325" r:id="rId7"/>
+    <p:sldId id="322" r:id="rId8"/>
+    <p:sldId id="326" r:id="rId9"/>
+    <p:sldId id="311" r:id="rId10"/>
+    <p:sldId id="324" r:id="rId11"/>
+    <p:sldId id="318" r:id="rId12"/>
+    <p:sldId id="286" r:id="rId13"/>
   </p:sldIdLst>
   <p:sldSz cx="9144000" cy="6858000" type="screen4x3"/>
   <p:notesSz cx="6858000" cy="9144000"/>
@@ -132,6 +133,9 @@
         </p15:guide>
       </p15:sldGuideLst>
     </p:ext>
+    <p:ext uri="{2D200454-40CA-4A62-9FC3-DE9A4176ACB9}">
+      <p15:notesGuideLst xmlns:p15="http://schemas.microsoft.com/office/powerpoint/2012/main"/>
+    </p:ext>
   </p:extLst>
 </p:presentation>
 </file>
@@ -224,7 +228,7 @@
           <a:p>
             <a:fld id="{DE0D2635-BDFF-FC4B-BBDA-1B5475F6174E}" type="datetimeFigureOut">
               <a:rPr lang="en-US" smtClean="0"/>
-              <a:t>9/29/22</a:t>
+              <a:t>9/30/22</a:t>
             </a:fld>
             <a:endParaRPr lang="en-US"/>
           </a:p>
@@ -575,6 +579,90 @@
 </p:notes>
 </file>
 
+<file path=ppt/notesSlides/notesSlide2.xml><?xml version="1.0" encoding="utf-8"?>
+<p:notes xmlns:a="http://schemas.openxmlformats.org/drawingml/2006/main" xmlns:r="http://schemas.openxmlformats.org/officeDocument/2006/relationships" xmlns:p="http://schemas.openxmlformats.org/presentationml/2006/main">
+  <p:cSld>
+    <p:spTree>
+      <p:nvGrpSpPr>
+        <p:cNvPr id="1" name=""/>
+        <p:cNvGrpSpPr/>
+        <p:nvPr/>
+      </p:nvGrpSpPr>
+      <p:grpSpPr>
+        <a:xfrm>
+          <a:off x="0" y="0"/>
+          <a:ext cx="0" cy="0"/>
+          <a:chOff x="0" y="0"/>
+          <a:chExt cx="0" cy="0"/>
+        </a:xfrm>
+      </p:grpSpPr>
+      <p:sp>
+        <p:nvSpPr>
+          <p:cNvPr id="2" name="Slide Image Placeholder 1"/>
+          <p:cNvSpPr>
+            <a:spLocks noGrp="1" noRot="1" noChangeAspect="1"/>
+          </p:cNvSpPr>
+          <p:nvPr>
+            <p:ph type="sldImg"/>
+          </p:nvPr>
+        </p:nvSpPr>
+        <p:spPr/>
+      </p:sp>
+      <p:sp>
+        <p:nvSpPr>
+          <p:cNvPr id="3" name="Notes Placeholder 2"/>
+          <p:cNvSpPr>
+            <a:spLocks noGrp="1"/>
+          </p:cNvSpPr>
+          <p:nvPr>
+            <p:ph type="body" idx="1"/>
+          </p:nvPr>
+        </p:nvSpPr>
+        <p:spPr/>
+        <p:txBody>
+          <a:bodyPr/>
+          <a:lstStyle/>
+          <a:p>
+            <a:endParaRPr lang="en-BE"/>
+          </a:p>
+        </p:txBody>
+      </p:sp>
+      <p:sp>
+        <p:nvSpPr>
+          <p:cNvPr id="4" name="Slide Number Placeholder 3"/>
+          <p:cNvSpPr>
+            <a:spLocks noGrp="1"/>
+          </p:cNvSpPr>
+          <p:nvPr>
+            <p:ph type="sldNum" sz="quarter" idx="5"/>
+          </p:nvPr>
+        </p:nvSpPr>
+        <p:spPr/>
+        <p:txBody>
+          <a:bodyPr/>
+          <a:lstStyle/>
+          <a:p>
+            <a:fld id="{3AC6567A-8943-E94A-BBFA-FBE129BB0318}" type="slidenum">
+              <a:rPr lang="en-US" smtClean="0"/>
+              <a:t>5</a:t>
+            </a:fld>
+            <a:endParaRPr lang="en-US"/>
+          </a:p>
+        </p:txBody>
+      </p:sp>
+    </p:spTree>
+    <p:extLst>
+      <p:ext uri="{BB962C8B-B14F-4D97-AF65-F5344CB8AC3E}">
+        <p14:creationId xmlns:p14="http://schemas.microsoft.com/office/powerpoint/2010/main" val="1235852665"/>
+      </p:ext>
+    </p:extLst>
+  </p:cSld>
+  <p:clrMapOvr>
+    <a:masterClrMapping/>
+  </p:clrMapOvr>
+</p:notes>
+</file>
+
 <file path=ppt/slideLayouts/slideLayout1.xml><?xml version="1.0" encoding="utf-8"?>
 <p:sldLayout xmlns:a="http://schemas.openxmlformats.org/drawingml/2006/main" xmlns:r="http://schemas.openxmlformats.org/officeDocument/2006/relationships" xmlns:p="http://schemas.openxmlformats.org/presentationml/2006/main" type="title" preserve="1">
   <p:cSld name="Title Slide">
@@ -754,7 +842,7 @@
           <a:p>
             <a:fld id="{7212EF1E-2CB8-C54B-94EB-0C51FB85BFE6}" type="datetimeFigureOut">
               <a:rPr lang="en-US" smtClean="0"/>
-              <a:t>9/29/22</a:t>
+              <a:t>9/30/22</a:t>
             </a:fld>
             <a:endParaRPr lang="en-US"/>
           </a:p>
@@ -922,7 +1010,7 @@
           <a:p>
             <a:fld id="{7212EF1E-2CB8-C54B-94EB-0C51FB85BFE6}" type="datetimeFigureOut">
               <a:rPr lang="en-US" smtClean="0"/>
-              <a:t>9/29/22</a:t>
+              <a:t>9/30/22</a:t>
             </a:fld>
             <a:endParaRPr lang="en-US"/>
           </a:p>
@@ -1100,7 +1188,7 @@
           <a:p>
             <a:fld id="{7212EF1E-2CB8-C54B-94EB-0C51FB85BFE6}" type="datetimeFigureOut">
               <a:rPr lang="en-US" smtClean="0"/>
-              <a:t>9/29/22</a:t>
+              <a:t>9/30/22</a:t>
             </a:fld>
             <a:endParaRPr lang="en-US"/>
           </a:p>
@@ -1268,7 +1356,7 @@
           <a:p>
             <a:fld id="{7212EF1E-2CB8-C54B-94EB-0C51FB85BFE6}" type="datetimeFigureOut">
               <a:rPr lang="en-US" smtClean="0"/>
-              <a:t>9/29/22</a:t>
+              <a:t>9/30/22</a:t>
             </a:fld>
             <a:endParaRPr lang="en-US"/>
           </a:p>
@@ -1513,7 +1601,7 @@
           <a:p>
             <a:fld id="{7212EF1E-2CB8-C54B-94EB-0C51FB85BFE6}" type="datetimeFigureOut">
               <a:rPr lang="en-US" smtClean="0"/>
-              <a:t>9/29/22</a:t>
+              <a:t>9/30/22</a:t>
             </a:fld>
             <a:endParaRPr lang="en-US"/>
           </a:p>
@@ -1798,7 +1886,7 @@
           <a:p>
             <a:fld id="{7212EF1E-2CB8-C54B-94EB-0C51FB85BFE6}" type="datetimeFigureOut">
               <a:rPr lang="en-US" smtClean="0"/>
-              <a:t>9/29/22</a:t>
+              <a:t>9/30/22</a:t>
             </a:fld>
             <a:endParaRPr lang="en-US"/>
           </a:p>
@@ -2217,7 +2305,7 @@
           <a:p>
             <a:fld id="{7212EF1E-2CB8-C54B-94EB-0C51FB85BFE6}" type="datetimeFigureOut">
               <a:rPr lang="en-US" smtClean="0"/>
-              <a:t>9/29/22</a:t>
+              <a:t>9/30/22</a:t>
             </a:fld>
             <a:endParaRPr lang="en-US"/>
           </a:p>
@@ -2334,7 +2422,7 @@
           <a:p>
             <a:fld id="{7212EF1E-2CB8-C54B-94EB-0C51FB85BFE6}" type="datetimeFigureOut">
               <a:rPr lang="en-US" smtClean="0"/>
-              <a:t>9/29/22</a:t>
+              <a:t>9/30/22</a:t>
             </a:fld>
             <a:endParaRPr lang="en-US"/>
           </a:p>
@@ -2429,7 +2517,7 @@
           <a:p>
             <a:fld id="{7212EF1E-2CB8-C54B-94EB-0C51FB85BFE6}" type="datetimeFigureOut">
               <a:rPr lang="en-US" smtClean="0"/>
-              <a:t>9/29/22</a:t>
+              <a:t>9/30/22</a:t>
             </a:fld>
             <a:endParaRPr lang="en-US"/>
           </a:p>
@@ -2704,7 +2792,7 @@
           <a:p>
             <a:fld id="{7212EF1E-2CB8-C54B-94EB-0C51FB85BFE6}" type="datetimeFigureOut">
               <a:rPr lang="en-US" smtClean="0"/>
-              <a:t>9/29/22</a:t>
+              <a:t>9/30/22</a:t>
             </a:fld>
             <a:endParaRPr lang="en-US"/>
           </a:p>
@@ -2956,7 +3044,7 @@
           <a:p>
             <a:fld id="{7212EF1E-2CB8-C54B-94EB-0C51FB85BFE6}" type="datetimeFigureOut">
               <a:rPr lang="en-US" smtClean="0"/>
-              <a:t>9/29/22</a:t>
+              <a:t>9/30/22</a:t>
             </a:fld>
             <a:endParaRPr lang="en-US"/>
           </a:p>
@@ -3167,7 +3255,7 @@
           <a:p>
             <a:fld id="{7212EF1E-2CB8-C54B-94EB-0C51FB85BFE6}" type="datetimeFigureOut">
               <a:rPr lang="en-US" smtClean="0"/>
-              <a:t>9/29/22</a:t>
+              <a:t>9/30/22</a:t>
             </a:fld>
             <a:endParaRPr lang="en-US"/>
           </a:p>
@@ -3733,10 +3821,10 @@
       </p:grpSpPr>
       <p:sp>
         <p:nvSpPr>
-          <p:cNvPr id="13" name="TextBox 12">
+          <p:cNvPr id="6" name="TextBox 5">
             <a:extLst>
               <a:ext uri="{FF2B5EF4-FFF2-40B4-BE49-F238E27FC236}">
-                <a16:creationId xmlns:a16="http://schemas.microsoft.com/office/drawing/2014/main" id="{608106AF-4310-0294-3A5A-C41DEAF2CE9D}"/>
+                <a16:creationId xmlns:a16="http://schemas.microsoft.com/office/drawing/2014/main" id="{4E76F532-0E70-BD79-81FA-4EA2444AE451}"/>
               </a:ext>
             </a:extLst>
           </p:cNvPr>
@@ -3745,8 +3833,8 @@
         </p:nvSpPr>
         <p:spPr>
           <a:xfrm>
-            <a:off x="529119" y="4155600"/>
-            <a:ext cx="8085762" cy="2308324"/>
+            <a:off x="529119" y="543006"/>
+            <a:ext cx="8085762" cy="1754326"/>
           </a:xfrm>
           <a:prstGeom prst="rect">
             <a:avLst/>
@@ -3765,7 +3853,7 @@
                 <a:latin typeface="Times New Roman" panose="02020603050405020304" pitchFamily="18" charset="0"/>
                 <a:cs typeface="Times New Roman" panose="02020603050405020304" pitchFamily="18" charset="0"/>
               </a:rPr>
-              <a:t>You will then see four circles presented on screen presented in 2 orientations (see Fig 1 &amp; 2).</a:t>
+              <a:t>The selected option will then be shown. The pie-chart will start spinning and stop after a while. If the arrow ends up pointing at the green region, you win the amount depicted in the amount circle (e.g., Fig 1). </a:t>
             </a:r>
           </a:p>
           <a:p>
@@ -3782,120 +3870,17 @@
                 <a:latin typeface="Times New Roman" panose="02020603050405020304" pitchFamily="18" charset="0"/>
                 <a:cs typeface="Times New Roman" panose="02020603050405020304" pitchFamily="18" charset="0"/>
               </a:rPr>
-              <a:t>One circle is green, and contains the letter W (above, left). This circle tells you </a:t>
-            </a:r>
-            <a:r>
-              <a:rPr lang="en-US" b="1" dirty="0">
-                <a:latin typeface="Times New Roman" panose="02020603050405020304" pitchFamily="18" charset="0"/>
-                <a:cs typeface="Times New Roman" panose="02020603050405020304" pitchFamily="18" charset="0"/>
-              </a:rPr>
-              <a:t>how many British pence you may win </a:t>
-            </a:r>
-            <a:r>
-              <a:rPr lang="en-US" dirty="0">
-                <a:latin typeface="Times New Roman" panose="02020603050405020304" pitchFamily="18" charset="0"/>
-                <a:cs typeface="Times New Roman" panose="02020603050405020304" pitchFamily="18" charset="0"/>
-              </a:rPr>
-              <a:t>in the current trial.</a:t>
-            </a:r>
-          </a:p>
-          <a:p>
-            <a:pPr algn="just"/>
-            <a:endParaRPr lang="en-US" dirty="0">
-              <a:latin typeface="Times New Roman" panose="02020603050405020304" pitchFamily="18" charset="0"/>
-              <a:cs typeface="Times New Roman" panose="02020603050405020304" pitchFamily="18" charset="0"/>
-            </a:endParaRPr>
-          </a:p>
-          <a:p>
-            <a:pPr algn="just"/>
-            <a:r>
-              <a:rPr lang="en-US" dirty="0">
-                <a:latin typeface="Times New Roman" panose="02020603050405020304" pitchFamily="18" charset="0"/>
-                <a:cs typeface="Times New Roman" panose="02020603050405020304" pitchFamily="18" charset="0"/>
-              </a:rPr>
-              <a:t>The other circle is red, and contains the letter L (above, right). This circle tells you </a:t>
-            </a:r>
-            <a:r>
-              <a:rPr lang="en-US" b="1" dirty="0">
-                <a:latin typeface="Times New Roman" panose="02020603050405020304" pitchFamily="18" charset="0"/>
-                <a:cs typeface="Times New Roman" panose="02020603050405020304" pitchFamily="18" charset="0"/>
-              </a:rPr>
-              <a:t>how many British pence you may lose </a:t>
-            </a:r>
-            <a:r>
-              <a:rPr lang="en-US" dirty="0">
-                <a:latin typeface="Times New Roman" panose="02020603050405020304" pitchFamily="18" charset="0"/>
-                <a:cs typeface="Times New Roman" panose="02020603050405020304" pitchFamily="18" charset="0"/>
-              </a:rPr>
-              <a:t>in the current trial.</a:t>
-            </a:r>
-          </a:p>
-        </p:txBody>
-      </p:sp>
-      <p:pic>
-        <p:nvPicPr>
-          <p:cNvPr id="3" name="Picture 2" descr="Chart, bubble chart&#10;&#10;Description automatically generated">
-            <a:extLst>
-              <a:ext uri="{FF2B5EF4-FFF2-40B4-BE49-F238E27FC236}">
-                <a16:creationId xmlns:a16="http://schemas.microsoft.com/office/drawing/2014/main" id="{5618235E-EEE3-B350-0A96-8B72B17AFD5F}"/>
-              </a:ext>
-            </a:extLst>
-          </p:cNvPr>
-          <p:cNvPicPr>
-            <a:picLocks noChangeAspect="1"/>
-          </p:cNvPicPr>
-          <p:nvPr/>
-        </p:nvPicPr>
-        <p:blipFill rotWithShape="1">
-          <a:blip r:embed="rId2"/>
-          <a:srcRect l="29652" t="20312" r="31572" b="18223"/>
-          <a:stretch/>
-        </p:blipFill>
-        <p:spPr>
-          <a:xfrm>
-            <a:off x="811764" y="125911"/>
-            <a:ext cx="3293705" cy="3263113"/>
-          </a:xfrm>
-          <a:prstGeom prst="rect">
-            <a:avLst/>
-          </a:prstGeom>
-        </p:spPr>
-      </p:pic>
-      <p:pic>
-        <p:nvPicPr>
-          <p:cNvPr id="6" name="Picture 5" descr="Chart, bubble chart&#10;&#10;Description automatically generated">
-            <a:extLst>
-              <a:ext uri="{FF2B5EF4-FFF2-40B4-BE49-F238E27FC236}">
-                <a16:creationId xmlns:a16="http://schemas.microsoft.com/office/drawing/2014/main" id="{9F4C5299-D35C-FA65-FC77-9FD0E163F828}"/>
-              </a:ext>
-            </a:extLst>
-          </p:cNvPr>
-          <p:cNvPicPr>
-            <a:picLocks noChangeAspect="1"/>
-          </p:cNvPicPr>
-          <p:nvPr/>
-        </p:nvPicPr>
-        <p:blipFill rotWithShape="1">
-          <a:blip r:embed="rId3"/>
-          <a:srcRect l="28451" t="19544" r="30012" b="16495"/>
-          <a:stretch/>
-        </p:blipFill>
-        <p:spPr>
-          <a:xfrm>
-            <a:off x="4758614" y="87181"/>
-            <a:ext cx="3470987" cy="3340574"/>
-          </a:xfrm>
-          <a:prstGeom prst="rect">
-            <a:avLst/>
-          </a:prstGeom>
-        </p:spPr>
-      </p:pic>
+              <a:t>Contrarily, if the arrow ends up pointing at the gray region, then you do not win any money (e.g., Fig 2).</a:t>
+            </a:r>
+          </a:p>
+        </p:txBody>
+      </p:sp>
       <p:sp>
         <p:nvSpPr>
           <p:cNvPr id="7" name="TextBox 6">
             <a:extLst>
               <a:ext uri="{FF2B5EF4-FFF2-40B4-BE49-F238E27FC236}">
-                <a16:creationId xmlns:a16="http://schemas.microsoft.com/office/drawing/2014/main" id="{CBF4F5BD-0E4A-7B6D-BE5A-C09402AAB121}"/>
+                <a16:creationId xmlns:a16="http://schemas.microsoft.com/office/drawing/2014/main" id="{D9D66287-7BBC-DD63-8A4D-86615AC5AE8F}"/>
               </a:ext>
             </a:extLst>
           </p:cNvPr>
@@ -3904,8 +3889,8 @@
         </p:nvSpPr>
         <p:spPr>
           <a:xfrm>
-            <a:off x="1550845" y="3570825"/>
-            <a:ext cx="1893730" cy="523220"/>
+            <a:off x="1093772" y="5308715"/>
+            <a:ext cx="2887801" cy="646331"/>
           </a:xfrm>
           <a:prstGeom prst="rect">
             <a:avLst/>
@@ -3920,21 +3905,33 @@
           <a:p>
             <a:pPr algn="ctr"/>
             <a:r>
-              <a:rPr lang="en-US" sz="1400" dirty="0">
-                <a:latin typeface="Times New Roman" panose="02020603050405020304" pitchFamily="18" charset="0"/>
-                <a:cs typeface="Times New Roman" panose="02020603050405020304" pitchFamily="18" charset="0"/>
-              </a:rPr>
-              <a:t>Fig. 1: Left-Right orientation</a:t>
-            </a:r>
-          </a:p>
-        </p:txBody>
-      </p:sp>
-      <p:sp>
-        <p:nvSpPr>
-          <p:cNvPr id="9" name="TextBox 8">
+              <a:rPr lang="en-US" dirty="0">
+                <a:latin typeface="Times New Roman" panose="02020603050405020304" pitchFamily="18" charset="0"/>
+                <a:cs typeface="Times New Roman" panose="02020603050405020304" pitchFamily="18" charset="0"/>
+              </a:rPr>
+              <a:t>Fig. 1: You win!</a:t>
+            </a:r>
+            <a:endParaRPr lang="en-US" dirty="0">
+              <a:latin typeface="Times New Roman" panose="02020603050405020304" pitchFamily="18" charset="0"/>
+              <a:cs typeface="Times New Roman" panose="02020603050405020304" pitchFamily="18" charset="0"/>
+              <a:sym typeface="Wingdings" pitchFamily="2" charset="2"/>
+            </a:endParaRPr>
+          </a:p>
+          <a:p>
+            <a:pPr algn="ctr"/>
+            <a:endParaRPr lang="en-US" dirty="0">
+              <a:latin typeface="Times New Roman" panose="02020603050405020304" pitchFamily="18" charset="0"/>
+              <a:cs typeface="Times New Roman" panose="02020603050405020304" pitchFamily="18" charset="0"/>
+            </a:endParaRPr>
+          </a:p>
+        </p:txBody>
+      </p:sp>
+      <p:sp>
+        <p:nvSpPr>
+          <p:cNvPr id="10" name="TextBox 9">
             <a:extLst>
               <a:ext uri="{FF2B5EF4-FFF2-40B4-BE49-F238E27FC236}">
-                <a16:creationId xmlns:a16="http://schemas.microsoft.com/office/drawing/2014/main" id="{A613ACBB-CD75-2DCC-780F-23CA0485BCC5}"/>
+                <a16:creationId xmlns:a16="http://schemas.microsoft.com/office/drawing/2014/main" id="{D84DFCAD-852A-0D60-32EA-0E821DACB585}"/>
               </a:ext>
             </a:extLst>
           </p:cNvPr>
@@ -3943,8 +3940,8 @@
         </p:nvSpPr>
         <p:spPr>
           <a:xfrm>
-            <a:off x="5547242" y="3499290"/>
-            <a:ext cx="1893730" cy="523220"/>
+            <a:off x="5283244" y="5308715"/>
+            <a:ext cx="2887801" cy="369332"/>
           </a:xfrm>
           <a:prstGeom prst="rect">
             <a:avLst/>
@@ -3959,21 +3956,26 @@
           <a:p>
             <a:pPr algn="ctr"/>
             <a:r>
-              <a:rPr lang="en-US" sz="1400" dirty="0">
-                <a:latin typeface="Times New Roman" panose="02020603050405020304" pitchFamily="18" charset="0"/>
-                <a:cs typeface="Times New Roman" panose="02020603050405020304" pitchFamily="18" charset="0"/>
-              </a:rPr>
-              <a:t>Fig. 2: Top-Down orientation</a:t>
-            </a:r>
+              <a:rPr lang="en-US" dirty="0">
+                <a:latin typeface="Times New Roman" panose="02020603050405020304" pitchFamily="18" charset="0"/>
+                <a:cs typeface="Times New Roman" panose="02020603050405020304" pitchFamily="18" charset="0"/>
+              </a:rPr>
+              <a:t>Fig. 2: You do not win.</a:t>
+            </a:r>
+            <a:endParaRPr lang="en-US" dirty="0">
+              <a:latin typeface="Times New Roman" panose="02020603050405020304" pitchFamily="18" charset="0"/>
+              <a:cs typeface="Times New Roman" panose="02020603050405020304" pitchFamily="18" charset="0"/>
+              <a:sym typeface="Wingdings" pitchFamily="2" charset="2"/>
+            </a:endParaRPr>
           </a:p>
         </p:txBody>
       </p:sp>
       <p:cxnSp>
         <p:nvCxnSpPr>
-          <p:cNvPr id="11" name="Straight Connector 10">
+          <p:cNvPr id="12" name="Straight Connector 11">
             <a:extLst>
               <a:ext uri="{FF2B5EF4-FFF2-40B4-BE49-F238E27FC236}">
-                <a16:creationId xmlns:a16="http://schemas.microsoft.com/office/drawing/2014/main" id="{5FE7DC72-10F8-3C4C-BD29-8770E4F0394E}"/>
+                <a16:creationId xmlns:a16="http://schemas.microsoft.com/office/drawing/2014/main" id="{8B474852-E2C4-7FCA-6C04-E36B3D1AFC70}"/>
               </a:ext>
             </a:extLst>
           </p:cNvPr>
@@ -3984,8 +3986,8 @@
         </p:nvCxnSpPr>
         <p:spPr>
           <a:xfrm>
-            <a:off x="4432041" y="345233"/>
-            <a:ext cx="0" cy="3225592"/>
+            <a:off x="4572000" y="2499435"/>
+            <a:ext cx="0" cy="3660733"/>
           </a:xfrm>
           <a:prstGeom prst="line">
             <a:avLst/>
@@ -4015,10 +4017,287 @@
           </a:fontRef>
         </p:style>
       </p:cxnSp>
+      <p:pic>
+        <p:nvPicPr>
+          <p:cNvPr id="8" name="Content Placeholder 5" descr="Icon&#10;&#10;Description automatically generated">
+            <a:extLst>
+              <a:ext uri="{FF2B5EF4-FFF2-40B4-BE49-F238E27FC236}">
+                <a16:creationId xmlns:a16="http://schemas.microsoft.com/office/drawing/2014/main" id="{8AD9FA0E-13A3-D011-724F-885E1D7D7FF9}"/>
+              </a:ext>
+            </a:extLst>
+          </p:cNvPr>
+          <p:cNvPicPr>
+            <a:picLocks noGrp="1" noChangeAspect="1"/>
+          </p:cNvPicPr>
+          <p:nvPr>
+            <p:ph idx="1"/>
+          </p:nvPr>
+        </p:nvPicPr>
+        <p:blipFill>
+          <a:blip r:embed="rId2"/>
+          <a:stretch>
+            <a:fillRect/>
+          </a:stretch>
+        </p:blipFill>
+        <p:spPr>
+          <a:xfrm>
+            <a:off x="2301015" y="3243985"/>
+            <a:ext cx="2064901" cy="1754327"/>
+          </a:xfrm>
+        </p:spPr>
+      </p:pic>
+      <p:pic>
+        <p:nvPicPr>
+          <p:cNvPr id="9" name="Content Placeholder 10" descr="A picture containing chart&#10;&#10;Description automatically generated">
+            <a:extLst>
+              <a:ext uri="{FF2B5EF4-FFF2-40B4-BE49-F238E27FC236}">
+                <a16:creationId xmlns:a16="http://schemas.microsoft.com/office/drawing/2014/main" id="{C5011FCE-A8DE-AE00-22D5-91D0C6343F07}"/>
+              </a:ext>
+            </a:extLst>
+          </p:cNvPr>
+          <p:cNvPicPr>
+            <a:picLocks noChangeAspect="1"/>
+          </p:cNvPicPr>
+          <p:nvPr/>
+        </p:nvPicPr>
+        <p:blipFill>
+          <a:blip r:embed="rId3"/>
+          <a:stretch>
+            <a:fillRect/>
+          </a:stretch>
+        </p:blipFill>
+        <p:spPr>
+          <a:xfrm rot="20129535">
+            <a:off x="419431" y="3124091"/>
+            <a:ext cx="1782636" cy="1896235"/>
+          </a:xfrm>
+          <a:prstGeom prst="rect">
+            <a:avLst/>
+          </a:prstGeom>
+        </p:spPr>
+      </p:pic>
+      <p:cxnSp>
+        <p:nvCxnSpPr>
+          <p:cNvPr id="14" name="Straight Arrow Connector 13">
+            <a:extLst>
+              <a:ext uri="{FF2B5EF4-FFF2-40B4-BE49-F238E27FC236}">
+                <a16:creationId xmlns:a16="http://schemas.microsoft.com/office/drawing/2014/main" id="{4AD3EC35-F9BF-54EC-5C15-7EE2EE739D2D}"/>
+              </a:ext>
+            </a:extLst>
+          </p:cNvPr>
+          <p:cNvCxnSpPr/>
+          <p:nvPr/>
+        </p:nvCxnSpPr>
+        <p:spPr>
+          <a:xfrm>
+            <a:off x="1277815" y="2839778"/>
+            <a:ext cx="0" cy="404207"/>
+          </a:xfrm>
+          <a:prstGeom prst="straightConnector1">
+            <a:avLst/>
+          </a:prstGeom>
+          <a:ln w="34925">
+            <a:solidFill>
+              <a:schemeClr val="tx1"/>
+            </a:solidFill>
+            <a:tailEnd type="triangle"/>
+          </a:ln>
+          <a:effectLst/>
+        </p:spPr>
+        <p:style>
+          <a:lnRef idx="2">
+            <a:schemeClr val="accent1"/>
+          </a:lnRef>
+          <a:fillRef idx="0">
+            <a:schemeClr val="accent1"/>
+          </a:fillRef>
+          <a:effectRef idx="1">
+            <a:schemeClr val="accent1"/>
+          </a:effectRef>
+          <a:fontRef idx="minor">
+            <a:schemeClr val="tx1"/>
+          </a:fontRef>
+        </p:style>
+      </p:cxnSp>
+      <p:sp>
+        <p:nvSpPr>
+          <p:cNvPr id="15" name="TextBox 14">
+            <a:extLst>
+              <a:ext uri="{FF2B5EF4-FFF2-40B4-BE49-F238E27FC236}">
+                <a16:creationId xmlns:a16="http://schemas.microsoft.com/office/drawing/2014/main" id="{B17ADA24-4CB8-4795-F6BD-27E70D19B53D}"/>
+              </a:ext>
+            </a:extLst>
+          </p:cNvPr>
+          <p:cNvSpPr txBox="1"/>
+          <p:nvPr/>
+        </p:nvSpPr>
+        <p:spPr>
+          <a:xfrm>
+            <a:off x="2720771" y="2671972"/>
+            <a:ext cx="1191481" cy="523220"/>
+          </a:xfrm>
+          <a:prstGeom prst="rect">
+            <a:avLst/>
+          </a:prstGeom>
+          <a:noFill/>
+        </p:spPr>
+        <p:txBody>
+          <a:bodyPr wrap="square" rtlCol="0">
+            <a:spAutoFit/>
+          </a:bodyPr>
+          <a:lstStyle/>
+          <a:p>
+            <a:pPr algn="ctr"/>
+            <a:r>
+              <a:rPr lang="en-BE" sz="2800" dirty="0"/>
+              <a:t>+30</a:t>
+            </a:r>
+          </a:p>
+        </p:txBody>
+      </p:sp>
+      <p:pic>
+        <p:nvPicPr>
+          <p:cNvPr id="16" name="Content Placeholder 5" descr="Icon&#10;&#10;Description automatically generated">
+            <a:extLst>
+              <a:ext uri="{FF2B5EF4-FFF2-40B4-BE49-F238E27FC236}">
+                <a16:creationId xmlns:a16="http://schemas.microsoft.com/office/drawing/2014/main" id="{7F171302-FAEA-A118-398C-7BB4B284C3B2}"/>
+              </a:ext>
+            </a:extLst>
+          </p:cNvPr>
+          <p:cNvPicPr>
+            <a:picLocks noChangeAspect="1"/>
+          </p:cNvPicPr>
+          <p:nvPr/>
+        </p:nvPicPr>
+        <p:blipFill>
+          <a:blip r:embed="rId2"/>
+          <a:stretch>
+            <a:fillRect/>
+          </a:stretch>
+        </p:blipFill>
+        <p:spPr>
+          <a:xfrm>
+            <a:off x="6766203" y="3253155"/>
+            <a:ext cx="2064901" cy="1754327"/>
+          </a:xfrm>
+          <a:prstGeom prst="rect">
+            <a:avLst/>
+          </a:prstGeom>
+        </p:spPr>
+      </p:pic>
+      <p:pic>
+        <p:nvPicPr>
+          <p:cNvPr id="17" name="Content Placeholder 10" descr="A picture containing chart&#10;&#10;Description automatically generated">
+            <a:extLst>
+              <a:ext uri="{FF2B5EF4-FFF2-40B4-BE49-F238E27FC236}">
+                <a16:creationId xmlns:a16="http://schemas.microsoft.com/office/drawing/2014/main" id="{72D84232-34C9-033A-07A8-A2684CE14812}"/>
+              </a:ext>
+            </a:extLst>
+          </p:cNvPr>
+          <p:cNvPicPr>
+            <a:picLocks noChangeAspect="1"/>
+          </p:cNvPicPr>
+          <p:nvPr/>
+        </p:nvPicPr>
+        <p:blipFill>
+          <a:blip r:embed="rId3"/>
+          <a:stretch>
+            <a:fillRect/>
+          </a:stretch>
+        </p:blipFill>
+        <p:spPr>
+          <a:xfrm rot="6884580">
+            <a:off x="4884619" y="3227045"/>
+            <a:ext cx="1782636" cy="1896235"/>
+          </a:xfrm>
+          <a:prstGeom prst="rect">
+            <a:avLst/>
+          </a:prstGeom>
+        </p:spPr>
+      </p:pic>
+      <p:cxnSp>
+        <p:nvCxnSpPr>
+          <p:cNvPr id="18" name="Straight Arrow Connector 17">
+            <a:extLst>
+              <a:ext uri="{FF2B5EF4-FFF2-40B4-BE49-F238E27FC236}">
+                <a16:creationId xmlns:a16="http://schemas.microsoft.com/office/drawing/2014/main" id="{1B317713-5A73-5ED2-6255-60B3E278E8C0}"/>
+              </a:ext>
+            </a:extLst>
+          </p:cNvPr>
+          <p:cNvCxnSpPr/>
+          <p:nvPr/>
+        </p:nvCxnSpPr>
+        <p:spPr>
+          <a:xfrm>
+            <a:off x="5743003" y="2848948"/>
+            <a:ext cx="0" cy="404207"/>
+          </a:xfrm>
+          <a:prstGeom prst="straightConnector1">
+            <a:avLst/>
+          </a:prstGeom>
+          <a:ln w="34925">
+            <a:solidFill>
+              <a:schemeClr val="tx1"/>
+            </a:solidFill>
+            <a:tailEnd type="triangle"/>
+          </a:ln>
+          <a:effectLst/>
+        </p:spPr>
+        <p:style>
+          <a:lnRef idx="2">
+            <a:schemeClr val="accent1"/>
+          </a:lnRef>
+          <a:fillRef idx="0">
+            <a:schemeClr val="accent1"/>
+          </a:fillRef>
+          <a:effectRef idx="1">
+            <a:schemeClr val="accent1"/>
+          </a:effectRef>
+          <a:fontRef idx="minor">
+            <a:schemeClr val="tx1"/>
+          </a:fontRef>
+        </p:style>
+      </p:cxnSp>
+      <p:sp>
+        <p:nvSpPr>
+          <p:cNvPr id="19" name="TextBox 18">
+            <a:extLst>
+              <a:ext uri="{FF2B5EF4-FFF2-40B4-BE49-F238E27FC236}">
+                <a16:creationId xmlns:a16="http://schemas.microsoft.com/office/drawing/2014/main" id="{351A7BD3-CCE1-712E-3FA4-8D4A8570FBC7}"/>
+              </a:ext>
+            </a:extLst>
+          </p:cNvPr>
+          <p:cNvSpPr txBox="1"/>
+          <p:nvPr/>
+        </p:nvSpPr>
+        <p:spPr>
+          <a:xfrm>
+            <a:off x="7246998" y="2741658"/>
+            <a:ext cx="1191481" cy="523220"/>
+          </a:xfrm>
+          <a:prstGeom prst="rect">
+            <a:avLst/>
+          </a:prstGeom>
+          <a:noFill/>
+        </p:spPr>
+        <p:txBody>
+          <a:bodyPr wrap="square" rtlCol="0">
+            <a:spAutoFit/>
+          </a:bodyPr>
+          <a:lstStyle/>
+          <a:p>
+            <a:pPr algn="ctr"/>
+            <a:r>
+              <a:rPr lang="en-BE" sz="2800" dirty="0"/>
+              <a:t>0</a:t>
+            </a:r>
+          </a:p>
+        </p:txBody>
+      </p:sp>
     </p:spTree>
     <p:extLst>
       <p:ext uri="{BB962C8B-B14F-4D97-AF65-F5344CB8AC3E}">
-        <p14:creationId xmlns:p14="http://schemas.microsoft.com/office/powerpoint/2010/main" val="1063728983"/>
+        <p14:creationId xmlns:p14="http://schemas.microsoft.com/office/powerpoint/2010/main" val="3236447987"/>
       </p:ext>
     </p:extLst>
   </p:cSld>
@@ -4047,6 +4326,92 @@
       </p:grpSpPr>
       <p:sp>
         <p:nvSpPr>
+          <p:cNvPr id="2" name="TextBox 1">
+            <a:extLst>
+              <a:ext uri="{FF2B5EF4-FFF2-40B4-BE49-F238E27FC236}">
+                <a16:creationId xmlns:a16="http://schemas.microsoft.com/office/drawing/2014/main" id="{0C5C16C7-26D5-0D89-8C19-AFF8A902A2EA}"/>
+              </a:ext>
+            </a:extLst>
+          </p:cNvPr>
+          <p:cNvSpPr txBox="1"/>
+          <p:nvPr/>
+        </p:nvSpPr>
+        <p:spPr>
+          <a:xfrm>
+            <a:off x="529119" y="2064361"/>
+            <a:ext cx="8085762" cy="1477328"/>
+          </a:xfrm>
+          <a:prstGeom prst="rect">
+            <a:avLst/>
+          </a:prstGeom>
+          <a:noFill/>
+        </p:spPr>
+        <p:txBody>
+          <a:bodyPr wrap="square" rtlCol="0">
+            <a:spAutoFit/>
+          </a:bodyPr>
+          <a:lstStyle/>
+          <a:p>
+            <a:pPr algn="just"/>
+            <a:r>
+              <a:rPr lang="en-US" dirty="0">
+                <a:latin typeface="Times New Roman" panose="02020603050405020304" pitchFamily="18" charset="0"/>
+                <a:cs typeface="Times New Roman" panose="02020603050405020304" pitchFamily="18" charset="0"/>
+              </a:rPr>
+              <a:t>If there is anything unclear about the rules, you can go back to the previous pages (by pressing the previous button below) and read them again.</a:t>
+            </a:r>
+          </a:p>
+          <a:p>
+            <a:pPr algn="just"/>
+            <a:endParaRPr lang="en-US" dirty="0">
+              <a:latin typeface="Times New Roman" panose="02020603050405020304" pitchFamily="18" charset="0"/>
+              <a:cs typeface="Times New Roman" panose="02020603050405020304" pitchFamily="18" charset="0"/>
+            </a:endParaRPr>
+          </a:p>
+          <a:p>
+            <a:pPr algn="just"/>
+            <a:r>
+              <a:rPr lang="en-US" dirty="0">
+                <a:latin typeface="Times New Roman" panose="02020603050405020304" pitchFamily="18" charset="0"/>
+                <a:cs typeface="Times New Roman" panose="02020603050405020304" pitchFamily="18" charset="0"/>
+              </a:rPr>
+              <a:t>You will first get 6 trials to get familiar with the task. The results from these practice trials do not count.</a:t>
+            </a:r>
+          </a:p>
+        </p:txBody>
+      </p:sp>
+    </p:spTree>
+    <p:extLst>
+      <p:ext uri="{BB962C8B-B14F-4D97-AF65-F5344CB8AC3E}">
+        <p14:creationId xmlns:p14="http://schemas.microsoft.com/office/powerpoint/2010/main" val="904502395"/>
+      </p:ext>
+    </p:extLst>
+  </p:cSld>
+  <p:clrMapOvr>
+    <a:masterClrMapping/>
+  </p:clrMapOvr>
+</p:sld>
+</file>
+
+<file path=ppt/slides/slide12.xml><?xml version="1.0" encoding="utf-8"?>
+<p:sld xmlns:a="http://schemas.openxmlformats.org/drawingml/2006/main" xmlns:r="http://schemas.openxmlformats.org/officeDocument/2006/relationships" xmlns:p="http://schemas.openxmlformats.org/presentationml/2006/main">
+  <p:cSld>
+    <p:spTree>
+      <p:nvGrpSpPr>
+        <p:cNvPr id="1" name=""/>
+        <p:cNvGrpSpPr/>
+        <p:nvPr/>
+      </p:nvGrpSpPr>
+      <p:grpSpPr>
+        <a:xfrm>
+          <a:off x="0" y="0"/>
+          <a:ext cx="0" cy="0"/>
+          <a:chOff x="0" y="0"/>
+          <a:chExt cx="0" cy="0"/>
+        </a:xfrm>
+      </p:grpSpPr>
+      <p:sp>
+        <p:nvSpPr>
           <p:cNvPr id="4" name="TextBox 3">
             <a:extLst>
               <a:ext uri="{FF2B5EF4-FFF2-40B4-BE49-F238E27FC236}">
@@ -4079,7 +4444,21 @@
                 <a:latin typeface="Times New Roman" panose="02020603050405020304" pitchFamily="18" charset="0"/>
                 <a:cs typeface="Times New Roman" panose="02020603050405020304" pitchFamily="18" charset="0"/>
               </a:rPr>
-              <a:t>That was the practice. The rules for the real task are the same. You will now play 114 trials in total. At the end of the experiment, the program will randomly pick 10 trials, and add up the money on these 10 trials. You can win a maximum of 1 British pound as bonus. In case your total is 0 or negative, you will not get any bonus.</a:t>
+              <a:t>That was the practice. The rules for the real task are the same. You will now </a:t>
+            </a:r>
+            <a:r>
+              <a:rPr lang="en-US">
+                <a:latin typeface="Times New Roman" panose="02020603050405020304" pitchFamily="18" charset="0"/>
+                <a:cs typeface="Times New Roman" panose="02020603050405020304" pitchFamily="18" charset="0"/>
+              </a:rPr>
+              <a:t>play 90 </a:t>
+            </a:r>
+            <a:r>
+              <a:rPr lang="en-US" dirty="0">
+                <a:latin typeface="Times New Roman" panose="02020603050405020304" pitchFamily="18" charset="0"/>
+                <a:cs typeface="Times New Roman" panose="02020603050405020304" pitchFamily="18" charset="0"/>
+              </a:rPr>
+              <a:t>trials in total. At the end of the experiment, the program will randomly pick 10 trials, and add up the money on these 10 trials. You can win a maximum of 1 British pound as bonus. In case your total is 0 or negative, you will not get any bonus.</a:t>
             </a:r>
           </a:p>
           <a:p>
@@ -4280,7 +4659,7 @@
         </p:nvSpPr>
         <p:spPr>
           <a:xfrm>
-            <a:off x="537426" y="3726684"/>
+            <a:off x="529119" y="3518136"/>
             <a:ext cx="8085762" cy="923330"/>
           </a:xfrm>
           <a:prstGeom prst="rect">
@@ -4300,7 +4679,7 @@
                 <a:latin typeface="Times New Roman" panose="02020603050405020304" pitchFamily="18" charset="0"/>
                 <a:cs typeface="Times New Roman" panose="02020603050405020304" pitchFamily="18" charset="0"/>
               </a:rPr>
-              <a:t>At the beginning of each trial, you will see a Start button (see above), with the total number of trials (in this e.g., 114) and the current trial number. Whenever you are ready, </a:t>
+              <a:t>At the beginning of each trial, you will see a Start button (see above), with the total number of trials (in this example, 6 trials) and the current trial number. Whenever you are ready, </a:t>
             </a:r>
             <a:r>
               <a:rPr lang="en-US" b="1" dirty="0">
@@ -4321,10 +4700,10 @@
       </p:sp>
       <p:pic>
         <p:nvPicPr>
-          <p:cNvPr id="3" name="Picture 2" descr="Graphical user interface, application&#10;&#10;Description automatically generated">
+          <p:cNvPr id="4" name="Picture 3">
             <a:extLst>
               <a:ext uri="{FF2B5EF4-FFF2-40B4-BE49-F238E27FC236}">
-                <a16:creationId xmlns:a16="http://schemas.microsoft.com/office/drawing/2014/main" id="{76497A0B-F4BB-9DC4-9462-136680E6B85F}"/>
+                <a16:creationId xmlns:a16="http://schemas.microsoft.com/office/drawing/2014/main" id="{4E8EC5A3-7FEF-70DA-F672-3967A5BEF5B9}"/>
               </a:ext>
             </a:extLst>
           </p:cNvPr>
@@ -4333,24 +4712,20 @@
           </p:cNvPicPr>
           <p:nvPr/>
         </p:nvPicPr>
-        <p:blipFill rotWithShape="1">
+        <p:blipFill>
           <a:blip r:embed="rId3"/>
-          <a:srcRect l="20153" t="21978" r="19560" b="24909"/>
-          <a:stretch/>
+          <a:stretch>
+            <a:fillRect/>
+          </a:stretch>
         </p:blipFill>
         <p:spPr>
           <a:xfrm>
-            <a:off x="2784230" y="926123"/>
-            <a:ext cx="3575539" cy="1699847"/>
+            <a:off x="2581609" y="1653978"/>
+            <a:ext cx="3980782" cy="1566474"/>
           </a:xfrm>
           <a:prstGeom prst="rect">
             <a:avLst/>
           </a:prstGeom>
-          <a:ln w="25400">
-            <a:solidFill>
-              <a:schemeClr val="tx1"/>
-            </a:solidFill>
-          </a:ln>
         </p:spPr>
       </p:pic>
     </p:spTree>
@@ -4383,110 +4758,6 @@
           <a:chExt cx="0" cy="0"/>
         </a:xfrm>
       </p:grpSpPr>
-      <p:sp>
-        <p:nvSpPr>
-          <p:cNvPr id="13" name="TextBox 12">
-            <a:extLst>
-              <a:ext uri="{FF2B5EF4-FFF2-40B4-BE49-F238E27FC236}">
-                <a16:creationId xmlns:a16="http://schemas.microsoft.com/office/drawing/2014/main" id="{608106AF-4310-0294-3A5A-C41DEAF2CE9D}"/>
-              </a:ext>
-            </a:extLst>
-          </p:cNvPr>
-          <p:cNvSpPr txBox="1"/>
-          <p:nvPr/>
-        </p:nvSpPr>
-        <p:spPr>
-          <a:xfrm>
-            <a:off x="839754" y="511578"/>
-            <a:ext cx="7492482" cy="1477328"/>
-          </a:xfrm>
-          <a:prstGeom prst="rect">
-            <a:avLst/>
-          </a:prstGeom>
-          <a:noFill/>
-        </p:spPr>
-        <p:txBody>
-          <a:bodyPr wrap="square" rtlCol="0">
-            <a:spAutoFit/>
-          </a:bodyPr>
-          <a:lstStyle/>
-          <a:p>
-            <a:pPr algn="just"/>
-            <a:r>
-              <a:rPr lang="en-US" dirty="0">
-                <a:latin typeface="Times New Roman" panose="02020603050405020304" pitchFamily="18" charset="0"/>
-                <a:cs typeface="Times New Roman" panose="02020603050405020304" pitchFamily="18" charset="0"/>
-              </a:rPr>
-              <a:t>You will then see four circles presented on screen in 2 orientations (see Fig 1 &amp; 2) presenting you with two gamble options:</a:t>
-            </a:r>
-          </a:p>
-          <a:p>
-            <a:pPr algn="just"/>
-            <a:r>
-              <a:rPr lang="en-US" dirty="0">
-                <a:latin typeface="Times New Roman" panose="02020603050405020304" pitchFamily="18" charset="0"/>
-                <a:cs typeface="Times New Roman" panose="02020603050405020304" pitchFamily="18" charset="0"/>
-              </a:rPr>
-              <a:t> </a:t>
-            </a:r>
-          </a:p>
-          <a:p>
-            <a:pPr marL="285750" indent="-285750" algn="just">
-              <a:buFont typeface="Arial" panose="020B0604020202020204" pitchFamily="34" charset="0"/>
-              <a:buChar char="•"/>
-            </a:pPr>
-            <a:r>
-              <a:rPr lang="en-US" dirty="0">
-                <a:latin typeface="Times New Roman" panose="02020603050405020304" pitchFamily="18" charset="0"/>
-                <a:cs typeface="Times New Roman" panose="02020603050405020304" pitchFamily="18" charset="0"/>
-              </a:rPr>
-              <a:t>Blue Gamble (indicated by the blue circles).</a:t>
-            </a:r>
-          </a:p>
-          <a:p>
-            <a:pPr marL="285750" indent="-285750" algn="just">
-              <a:buFont typeface="Arial" panose="020B0604020202020204" pitchFamily="34" charset="0"/>
-              <a:buChar char="•"/>
-            </a:pPr>
-            <a:r>
-              <a:rPr lang="en-US" dirty="0">
-                <a:latin typeface="Times New Roman" panose="02020603050405020304" pitchFamily="18" charset="0"/>
-                <a:cs typeface="Times New Roman" panose="02020603050405020304" pitchFamily="18" charset="0"/>
-              </a:rPr>
-              <a:t>Yellow Gamble (indicated by the yellow circles).</a:t>
-            </a:r>
-          </a:p>
-        </p:txBody>
-      </p:sp>
-      <p:pic>
-        <p:nvPicPr>
-          <p:cNvPr id="3" name="Picture 2" descr="Chart, bubble chart&#10;&#10;Description automatically generated">
-            <a:extLst>
-              <a:ext uri="{FF2B5EF4-FFF2-40B4-BE49-F238E27FC236}">
-                <a16:creationId xmlns:a16="http://schemas.microsoft.com/office/drawing/2014/main" id="{5618235E-EEE3-B350-0A96-8B72B17AFD5F}"/>
-              </a:ext>
-            </a:extLst>
-          </p:cNvPr>
-          <p:cNvPicPr>
-            <a:picLocks noChangeAspect="1"/>
-          </p:cNvPicPr>
-          <p:nvPr/>
-        </p:nvPicPr>
-        <p:blipFill rotWithShape="1">
-          <a:blip r:embed="rId2"/>
-          <a:srcRect l="29652" t="20312" r="31572" b="18223"/>
-          <a:stretch/>
-        </p:blipFill>
-        <p:spPr>
-          <a:xfrm>
-            <a:off x="914399" y="2169905"/>
-            <a:ext cx="3293705" cy="3263113"/>
-          </a:xfrm>
-          <a:prstGeom prst="rect">
-            <a:avLst/>
-          </a:prstGeom>
-        </p:spPr>
-      </p:pic>
       <p:pic>
         <p:nvPicPr>
           <p:cNvPr id="6" name="Picture 5" descr="Chart, bubble chart&#10;&#10;Description automatically generated">
@@ -4502,7 +4773,7 @@
           <p:nvPr/>
         </p:nvPicPr>
         <p:blipFill rotWithShape="1">
-          <a:blip r:embed="rId3"/>
+          <a:blip r:embed="rId2"/>
           <a:srcRect l="28451" t="19544" r="30012" b="16495"/>
           <a:stretch/>
         </p:blipFill>
@@ -4530,8 +4801,8 @@
         </p:nvSpPr>
         <p:spPr>
           <a:xfrm>
-            <a:off x="1653480" y="5614819"/>
-            <a:ext cx="1893730" cy="523220"/>
+            <a:off x="839757" y="5758727"/>
+            <a:ext cx="3694919" cy="307777"/>
           </a:xfrm>
           <a:prstGeom prst="rect">
             <a:avLst/>
@@ -4569,8 +4840,8 @@
         </p:nvSpPr>
         <p:spPr>
           <a:xfrm>
-            <a:off x="5649877" y="5543284"/>
-            <a:ext cx="1893730" cy="523220"/>
+            <a:off x="4635519" y="5758727"/>
+            <a:ext cx="4065747" cy="307777"/>
           </a:xfrm>
           <a:prstGeom prst="rect">
             <a:avLst/>
@@ -4641,6 +4912,122 @@
           </a:fontRef>
         </p:style>
       </p:cxnSp>
+      <p:pic>
+        <p:nvPicPr>
+          <p:cNvPr id="4" name="Picture 3" descr="A picture containing diagram&#10;&#10;Description automatically generated">
+            <a:extLst>
+              <a:ext uri="{FF2B5EF4-FFF2-40B4-BE49-F238E27FC236}">
+                <a16:creationId xmlns:a16="http://schemas.microsoft.com/office/drawing/2014/main" id="{DB06DDCD-0135-06E5-C71F-9D665AFBBBF2}"/>
+              </a:ext>
+            </a:extLst>
+          </p:cNvPr>
+          <p:cNvPicPr>
+            <a:picLocks noChangeAspect="1"/>
+          </p:cNvPicPr>
+          <p:nvPr/>
+        </p:nvPicPr>
+        <p:blipFill>
+          <a:blip r:embed="rId3"/>
+          <a:stretch>
+            <a:fillRect/>
+          </a:stretch>
+        </p:blipFill>
+        <p:spPr>
+          <a:xfrm>
+            <a:off x="4635519" y="2188666"/>
+            <a:ext cx="3922446" cy="3225592"/>
+          </a:xfrm>
+          <a:prstGeom prst="rect">
+            <a:avLst/>
+          </a:prstGeom>
+        </p:spPr>
+      </p:pic>
+      <p:pic>
+        <p:nvPicPr>
+          <p:cNvPr id="8" name="Picture 7" descr="A picture containing shape&#10;&#10;Description automatically generated">
+            <a:extLst>
+              <a:ext uri="{FF2B5EF4-FFF2-40B4-BE49-F238E27FC236}">
+                <a16:creationId xmlns:a16="http://schemas.microsoft.com/office/drawing/2014/main" id="{A3FE3BE6-F722-EC9B-B0F9-A149187B8EF9}"/>
+              </a:ext>
+            </a:extLst>
+          </p:cNvPr>
+          <p:cNvPicPr>
+            <a:picLocks noChangeAspect="1"/>
+          </p:cNvPicPr>
+          <p:nvPr/>
+        </p:nvPicPr>
+        <p:blipFill>
+          <a:blip r:embed="rId4"/>
+          <a:stretch>
+            <a:fillRect/>
+          </a:stretch>
+        </p:blipFill>
+        <p:spPr>
+          <a:xfrm>
+            <a:off x="580691" y="2169607"/>
+            <a:ext cx="3790699" cy="3264511"/>
+          </a:xfrm>
+          <a:prstGeom prst="rect">
+            <a:avLst/>
+          </a:prstGeom>
+        </p:spPr>
+      </p:pic>
+      <p:sp>
+        <p:nvSpPr>
+          <p:cNvPr id="13" name="TextBox 12">
+            <a:extLst>
+              <a:ext uri="{FF2B5EF4-FFF2-40B4-BE49-F238E27FC236}">
+                <a16:creationId xmlns:a16="http://schemas.microsoft.com/office/drawing/2014/main" id="{608106AF-4310-0294-3A5A-C41DEAF2CE9D}"/>
+              </a:ext>
+            </a:extLst>
+          </p:cNvPr>
+          <p:cNvSpPr txBox="1"/>
+          <p:nvPr/>
+        </p:nvSpPr>
+        <p:spPr>
+          <a:xfrm>
+            <a:off x="839757" y="366869"/>
+            <a:ext cx="7492482" cy="1477328"/>
+          </a:xfrm>
+          <a:prstGeom prst="rect">
+            <a:avLst/>
+          </a:prstGeom>
+          <a:noFill/>
+        </p:spPr>
+        <p:txBody>
+          <a:bodyPr wrap="square" rtlCol="0">
+            <a:spAutoFit/>
+          </a:bodyPr>
+          <a:lstStyle/>
+          <a:p>
+            <a:pPr algn="just"/>
+            <a:r>
+              <a:rPr lang="en-US" dirty="0">
+                <a:latin typeface="Times New Roman" panose="02020603050405020304" pitchFamily="18" charset="0"/>
+                <a:cs typeface="Times New Roman" panose="02020603050405020304" pitchFamily="18" charset="0"/>
+              </a:rPr>
+              <a:t>You will then see two options, a blue option and a yellow option. Each option will have two circles, colored either blue or yellow.</a:t>
+            </a:r>
+          </a:p>
+          <a:p>
+            <a:pPr algn="just"/>
+            <a:endParaRPr lang="en-US" dirty="0">
+              <a:latin typeface="Times New Roman" panose="02020603050405020304" pitchFamily="18" charset="0"/>
+              <a:cs typeface="Times New Roman" panose="02020603050405020304" pitchFamily="18" charset="0"/>
+            </a:endParaRPr>
+          </a:p>
+          <a:p>
+            <a:pPr algn="just"/>
+            <a:r>
+              <a:rPr lang="en-US" dirty="0">
+                <a:latin typeface="Times New Roman" panose="02020603050405020304" pitchFamily="18" charset="0"/>
+                <a:cs typeface="Times New Roman" panose="02020603050405020304" pitchFamily="18" charset="0"/>
+              </a:rPr>
+              <a:t>The two options will be shown either horizontally from left to right (Fig. 1) or vertically from top to bottom (Fig. 2).</a:t>
+            </a:r>
+          </a:p>
+        </p:txBody>
+      </p:sp>
     </p:spTree>
     <p:extLst>
       <p:ext uri="{BB962C8B-B14F-4D97-AF65-F5344CB8AC3E}">
@@ -4685,8 +5072,8 @@
         </p:nvSpPr>
         <p:spPr>
           <a:xfrm>
-            <a:off x="585840" y="978675"/>
-            <a:ext cx="8207636" cy="2585323"/>
+            <a:off x="468182" y="720768"/>
+            <a:ext cx="8207636" cy="2031325"/>
           </a:xfrm>
           <a:prstGeom prst="rect">
             <a:avLst/>
@@ -4705,7 +5092,7 @@
                 <a:latin typeface="Times New Roman" panose="02020603050405020304" pitchFamily="18" charset="0"/>
                 <a:cs typeface="Times New Roman" panose="02020603050405020304" pitchFamily="18" charset="0"/>
               </a:rPr>
-              <a:t>     Each gamble will present you with two pieces of information:</a:t>
+              <a:t>     Each option will contain two pieces of information, shown in two circles:</a:t>
             </a:r>
           </a:p>
           <a:p>
@@ -4725,7 +5112,7 @@
                 <a:latin typeface="Times New Roman" panose="02020603050405020304" pitchFamily="18" charset="0"/>
                 <a:cs typeface="Times New Roman" panose="02020603050405020304" pitchFamily="18" charset="0"/>
               </a:rPr>
-              <a:t>Amount information</a:t>
+              <a:t>Amount circle</a:t>
             </a:r>
             <a:r>
               <a:rPr lang="en-US" dirty="0">
@@ -4735,8 +5122,11 @@
               <a:t>: Indicated by the </a:t>
             </a:r>
             <a:r>
-              <a:rPr lang="en-BE" dirty="0"/>
-              <a:t>€</a:t>
+              <a:rPr lang="en-US" b="1" dirty="0">
+                <a:latin typeface="Times New Roman" panose="02020603050405020304" pitchFamily="18" charset="0"/>
+                <a:cs typeface="Times New Roman" panose="02020603050405020304" pitchFamily="18" charset="0"/>
+              </a:rPr>
+              <a:t>£</a:t>
             </a:r>
             <a:r>
               <a:rPr lang="en-US" dirty="0">
@@ -4750,14 +5140,14 @@
                 <a:latin typeface="Times New Roman" panose="02020603050405020304" pitchFamily="18" charset="0"/>
                 <a:cs typeface="Times New Roman" panose="02020603050405020304" pitchFamily="18" charset="0"/>
               </a:rPr>
-              <a:t>how many Euro cents you may win (or not win) </a:t>
+              <a:t>how many British pence you may win for a certain option</a:t>
             </a:r>
             <a:r>
               <a:rPr lang="en-US" dirty="0">
                 <a:latin typeface="Times New Roman" panose="02020603050405020304" pitchFamily="18" charset="0"/>
                 <a:cs typeface="Times New Roman" panose="02020603050405020304" pitchFamily="18" charset="0"/>
               </a:rPr>
-              <a:t>in the current trial.</a:t>
+              <a:t>.</a:t>
             </a:r>
           </a:p>
           <a:p>
@@ -4777,7 +5167,7 @@
                 <a:latin typeface="Times New Roman" panose="02020603050405020304" pitchFamily="18" charset="0"/>
                 <a:cs typeface="Times New Roman" panose="02020603050405020304" pitchFamily="18" charset="0"/>
               </a:rPr>
-              <a:t>Probability information</a:t>
+              <a:t>Probability circle</a:t>
             </a:r>
             <a:r>
               <a:rPr lang="en-US" dirty="0">
@@ -4805,83 +5195,175 @@
                 <a:latin typeface="Times New Roman" panose="02020603050405020304" pitchFamily="18" charset="0"/>
                 <a:cs typeface="Times New Roman" panose="02020603050405020304" pitchFamily="18" charset="0"/>
               </a:rPr>
-              <a:t>probability of winning (or not winning) the amount</a:t>
+              <a:t>probability of winning for a certain option</a:t>
             </a:r>
             <a:r>
               <a:rPr lang="en-US" dirty="0">
                 <a:latin typeface="Times New Roman" panose="02020603050405020304" pitchFamily="18" charset="0"/>
                 <a:cs typeface="Times New Roman" panose="02020603050405020304" pitchFamily="18" charset="0"/>
               </a:rPr>
-              <a:t> indicated in the amount circle.</a:t>
-            </a:r>
-          </a:p>
-          <a:p>
-            <a:pPr marL="285750" indent="-285750" algn="just">
-              <a:buFont typeface="Arial" panose="020B0604020202020204" pitchFamily="34" charset="0"/>
-              <a:buChar char="•"/>
-            </a:pPr>
-            <a:endParaRPr lang="en-BE" dirty="0"/>
-          </a:p>
-        </p:txBody>
-      </p:sp>
-      <p:pic>
-        <p:nvPicPr>
-          <p:cNvPr id="5" name="Picture 4" descr="Chart, bubble chart&#10;&#10;Description automatically generated">
+              <a:t>.</a:t>
+            </a:r>
+          </a:p>
+        </p:txBody>
+      </p:sp>
+      <p:grpSp>
+        <p:nvGrpSpPr>
+          <p:cNvPr id="6" name="Group 5">
             <a:extLst>
               <a:ext uri="{FF2B5EF4-FFF2-40B4-BE49-F238E27FC236}">
-                <a16:creationId xmlns:a16="http://schemas.microsoft.com/office/drawing/2014/main" id="{337DC77C-768C-AF76-ED40-9F07B0CE18EA}"/>
+                <a16:creationId xmlns:a16="http://schemas.microsoft.com/office/drawing/2014/main" id="{E26E2B16-2B81-DA6C-E78A-A7BC4310B0D3}"/>
               </a:ext>
             </a:extLst>
           </p:cNvPr>
-          <p:cNvPicPr>
-            <a:picLocks noChangeAspect="1"/>
-          </p:cNvPicPr>
+          <p:cNvGrpSpPr/>
           <p:nvPr/>
-        </p:nvPicPr>
-        <p:blipFill rotWithShape="1">
-          <a:blip r:embed="rId2"/>
-          <a:srcRect l="28451" t="19544" r="55260" b="54860"/>
-          <a:stretch/>
-        </p:blipFill>
-        <p:spPr>
-          <a:xfrm>
-            <a:off x="1071657" y="3209589"/>
-            <a:ext cx="3618001" cy="3553471"/>
-          </a:xfrm>
-          <a:prstGeom prst="rect">
-            <a:avLst/>
-          </a:prstGeom>
-        </p:spPr>
-      </p:pic>
-      <p:pic>
-        <p:nvPicPr>
-          <p:cNvPr id="6" name="Picture 5" descr="Chart, bubble chart&#10;&#10;Description automatically generated">
-            <a:extLst>
-              <a:ext uri="{FF2B5EF4-FFF2-40B4-BE49-F238E27FC236}">
-                <a16:creationId xmlns:a16="http://schemas.microsoft.com/office/drawing/2014/main" id="{466DB659-1FC2-89A1-5AD2-445DD39EF544}"/>
-              </a:ext>
-            </a:extLst>
-          </p:cNvPr>
-          <p:cNvPicPr>
-            <a:picLocks noChangeAspect="1"/>
-          </p:cNvPicPr>
-          <p:nvPr/>
-        </p:nvPicPr>
-        <p:blipFill rotWithShape="1">
-          <a:blip r:embed="rId2"/>
-          <a:srcRect l="52580" t="19544" r="30012" b="54860"/>
-          <a:stretch/>
-        </p:blipFill>
-        <p:spPr>
-          <a:xfrm>
-            <a:off x="4371277" y="3158431"/>
-            <a:ext cx="4025589" cy="3699569"/>
-          </a:xfrm>
-          <a:prstGeom prst="rect">
-            <a:avLst/>
-          </a:prstGeom>
-        </p:spPr>
-      </p:pic>
+        </p:nvGrpSpPr>
+        <p:grpSpPr>
+          <a:xfrm>
+            <a:off x="1723674" y="3165230"/>
+            <a:ext cx="5696652" cy="2921395"/>
+            <a:chOff x="1723674" y="3165230"/>
+            <a:chExt cx="5696652" cy="2921395"/>
+          </a:xfrm>
+        </p:grpSpPr>
+        <p:pic>
+          <p:nvPicPr>
+            <p:cNvPr id="5" name="Picture 4" descr="Chart, bubble chart&#10;&#10;Description automatically generated">
+              <a:extLst>
+                <a:ext uri="{FF2B5EF4-FFF2-40B4-BE49-F238E27FC236}">
+                  <a16:creationId xmlns:a16="http://schemas.microsoft.com/office/drawing/2014/main" id="{337DC77C-768C-AF76-ED40-9F07B0CE18EA}"/>
+                </a:ext>
+              </a:extLst>
+            </p:cNvPr>
+            <p:cNvPicPr>
+              <a:picLocks noChangeAspect="1"/>
+            </p:cNvPicPr>
+            <p:nvPr/>
+          </p:nvPicPr>
+          <p:blipFill rotWithShape="1">
+            <a:blip r:embed="rId3"/>
+            <a:srcRect l="29678" t="21304" r="57250" b="57653"/>
+            <a:stretch/>
+          </p:blipFill>
+          <p:spPr>
+            <a:xfrm>
+              <a:off x="4863796" y="3165230"/>
+              <a:ext cx="2556530" cy="2572093"/>
+            </a:xfrm>
+            <a:prstGeom prst="rect">
+              <a:avLst/>
+            </a:prstGeom>
+          </p:spPr>
+        </p:pic>
+        <p:pic>
+          <p:nvPicPr>
+            <p:cNvPr id="2" name="Picture 1" descr="A picture containing shape&#10;&#10;Description automatically generated">
+              <a:extLst>
+                <a:ext uri="{FF2B5EF4-FFF2-40B4-BE49-F238E27FC236}">
+                  <a16:creationId xmlns:a16="http://schemas.microsoft.com/office/drawing/2014/main" id="{1DE0DD02-2CB5-D5AF-DB32-FEDBCD12E573}"/>
+                </a:ext>
+              </a:extLst>
+            </p:cNvPr>
+            <p:cNvPicPr>
+              <a:picLocks noChangeAspect="1"/>
+            </p:cNvPicPr>
+            <p:nvPr/>
+          </p:nvPicPr>
+          <p:blipFill rotWithShape="1">
+            <a:blip r:embed="rId4"/>
+            <a:srcRect l="62040" t="688" r="7723" b="65846"/>
+            <a:stretch/>
+          </p:blipFill>
+          <p:spPr>
+            <a:xfrm>
+              <a:off x="1723674" y="3286999"/>
+              <a:ext cx="2421975" cy="2308324"/>
+            </a:xfrm>
+            <a:prstGeom prst="rect">
+              <a:avLst/>
+            </a:prstGeom>
+          </p:spPr>
+        </p:pic>
+        <p:sp>
+          <p:nvSpPr>
+            <p:cNvPr id="3" name="TextBox 2">
+              <a:extLst>
+                <a:ext uri="{FF2B5EF4-FFF2-40B4-BE49-F238E27FC236}">
+                  <a16:creationId xmlns:a16="http://schemas.microsoft.com/office/drawing/2014/main" id="{5CF0CFEC-7AB9-E909-4865-752734FE7BFE}"/>
+                </a:ext>
+              </a:extLst>
+            </p:cNvPr>
+            <p:cNvSpPr txBox="1"/>
+            <p:nvPr/>
+          </p:nvSpPr>
+          <p:spPr>
+            <a:xfrm>
+              <a:off x="2020261" y="5717293"/>
+              <a:ext cx="1828800" cy="369332"/>
+            </a:xfrm>
+            <a:prstGeom prst="rect">
+              <a:avLst/>
+            </a:prstGeom>
+            <a:noFill/>
+          </p:spPr>
+          <p:txBody>
+            <a:bodyPr wrap="square" rtlCol="0">
+              <a:spAutoFit/>
+            </a:bodyPr>
+            <a:lstStyle/>
+            <a:p>
+              <a:pPr algn="ctr"/>
+              <a:r>
+                <a:rPr lang="en-BE" dirty="0">
+                  <a:latin typeface="Times New Roman" panose="02020603050405020304" pitchFamily="18" charset="0"/>
+                  <a:cs typeface="Times New Roman" panose="02020603050405020304" pitchFamily="18" charset="0"/>
+                </a:rPr>
+                <a:t>Amount circle</a:t>
+              </a:r>
+            </a:p>
+          </p:txBody>
+        </p:sp>
+        <p:sp>
+          <p:nvSpPr>
+            <p:cNvPr id="4" name="TextBox 3">
+              <a:extLst>
+                <a:ext uri="{FF2B5EF4-FFF2-40B4-BE49-F238E27FC236}">
+                  <a16:creationId xmlns:a16="http://schemas.microsoft.com/office/drawing/2014/main" id="{853C52C5-B1BC-2DF9-F2CA-F000768D3E51}"/>
+                </a:ext>
+              </a:extLst>
+            </p:cNvPr>
+            <p:cNvSpPr txBox="1"/>
+            <p:nvPr/>
+          </p:nvSpPr>
+          <p:spPr>
+            <a:xfrm>
+              <a:off x="5217605" y="5717293"/>
+              <a:ext cx="1828800" cy="369332"/>
+            </a:xfrm>
+            <a:prstGeom prst="rect">
+              <a:avLst/>
+            </a:prstGeom>
+            <a:noFill/>
+          </p:spPr>
+          <p:txBody>
+            <a:bodyPr wrap="square" rtlCol="0">
+              <a:spAutoFit/>
+            </a:bodyPr>
+            <a:lstStyle/>
+            <a:p>
+              <a:pPr algn="ctr"/>
+              <a:r>
+                <a:rPr lang="en-BE" dirty="0">
+                  <a:latin typeface="Times New Roman" panose="02020603050405020304" pitchFamily="18" charset="0"/>
+                  <a:cs typeface="Times New Roman" panose="02020603050405020304" pitchFamily="18" charset="0"/>
+                </a:rPr>
+                <a:t>Probability circle</a:t>
+              </a:r>
+            </a:p>
+          </p:txBody>
+        </p:sp>
+      </p:grpSp>
     </p:spTree>
     <p:extLst>
       <p:ext uri="{BB962C8B-B14F-4D97-AF65-F5344CB8AC3E}">
@@ -4926,8 +5408,8 @@
         </p:nvSpPr>
         <p:spPr>
           <a:xfrm>
-            <a:off x="529119" y="191970"/>
-            <a:ext cx="8085762" cy="3754874"/>
+            <a:off x="395364" y="463500"/>
+            <a:ext cx="8353271" cy="2446824"/>
           </a:xfrm>
           <a:prstGeom prst="rect">
             <a:avLst/>
@@ -4946,21 +5428,7 @@
                 <a:latin typeface="Times New Roman" panose="02020603050405020304" pitchFamily="18" charset="0"/>
                 <a:cs typeface="Times New Roman" panose="02020603050405020304" pitchFamily="18" charset="0"/>
               </a:rPr>
-              <a:t>To see the amount and probability information, you need to </a:t>
-            </a:r>
-            <a:r>
-              <a:rPr lang="en-US" sz="1700" b="1" dirty="0">
-                <a:latin typeface="Times New Roman" panose="02020603050405020304" pitchFamily="18" charset="0"/>
-                <a:cs typeface="Times New Roman" panose="02020603050405020304" pitchFamily="18" charset="0"/>
-              </a:rPr>
-              <a:t>move the mouse cursor</a:t>
-            </a:r>
-            <a:r>
-              <a:rPr lang="en-US" sz="1700" dirty="0">
-                <a:latin typeface="Times New Roman" panose="02020603050405020304" pitchFamily="18" charset="0"/>
-                <a:cs typeface="Times New Roman" panose="02020603050405020304" pitchFamily="18" charset="0"/>
-              </a:rPr>
-              <a:t> inside each of the circles. You can do this for each gamble (Blue and Yellow) for each circle (amount and probability information) as many times as you would like. </a:t>
+              <a:t>To see the win amount and win probability of an option, you need to move the mouse cursor inside each of the circles.</a:t>
             </a:r>
           </a:p>
           <a:p>
@@ -4977,21 +5445,21 @@
                 <a:latin typeface="Times New Roman" panose="02020603050405020304" pitchFamily="18" charset="0"/>
                 <a:cs typeface="Times New Roman" panose="02020603050405020304" pitchFamily="18" charset="0"/>
               </a:rPr>
-              <a:t>Upon placing the </a:t>
+              <a:t>For instance, when you </a:t>
             </a:r>
             <a:r>
               <a:rPr lang="en-US" sz="1700" b="1" dirty="0">
                 <a:latin typeface="Times New Roman" panose="02020603050405020304" pitchFamily="18" charset="0"/>
                 <a:cs typeface="Times New Roman" panose="02020603050405020304" pitchFamily="18" charset="0"/>
               </a:rPr>
-              <a:t>mouse cursor inside the probability information circle </a:t>
+              <a:t>move the mouse cursor inside the amount circle, </a:t>
             </a:r>
             <a:r>
               <a:rPr lang="en-US" sz="1700" dirty="0">
                 <a:latin typeface="Times New Roman" panose="02020603050405020304" pitchFamily="18" charset="0"/>
                 <a:cs typeface="Times New Roman" panose="02020603050405020304" pitchFamily="18" charset="0"/>
               </a:rPr>
-              <a:t>you will see a pie-chart indicating the probability information in the colored part of the pie-chart (i.e., green part). </a:t>
+              <a:t>you will see a gray bar, with part of it colored green. The higher the green part, the more money you may win. The total height of the bar is 100 pence (1 Pound).</a:t>
             </a:r>
           </a:p>
           <a:p>
@@ -5008,76 +5476,17 @@
                 <a:latin typeface="Times New Roman" panose="02020603050405020304" pitchFamily="18" charset="0"/>
                 <a:cs typeface="Times New Roman" panose="02020603050405020304" pitchFamily="18" charset="0"/>
               </a:rPr>
-              <a:t>Likewise, upon placing the </a:t>
-            </a:r>
-            <a:r>
-              <a:rPr lang="en-US" sz="1700" b="1" dirty="0">
-                <a:latin typeface="Times New Roman" panose="02020603050405020304" pitchFamily="18" charset="0"/>
-                <a:cs typeface="Times New Roman" panose="02020603050405020304" pitchFamily="18" charset="0"/>
-              </a:rPr>
-              <a:t>mouse cursor inside the amount information circle </a:t>
-            </a:r>
-            <a:r>
-              <a:rPr lang="en-US" sz="1700" dirty="0">
-                <a:latin typeface="Times New Roman" panose="02020603050405020304" pitchFamily="18" charset="0"/>
-                <a:cs typeface="Times New Roman" panose="02020603050405020304" pitchFamily="18" charset="0"/>
-              </a:rPr>
-              <a:t>you will see a gray bar, with part of it colored green. The higher the green part, the more money you may win. The total height of the gray bar is 100 cents (1 Euro).</a:t>
-            </a:r>
-          </a:p>
-          <a:p>
-            <a:pPr algn="just"/>
-            <a:endParaRPr lang="en-US" sz="1700" dirty="0">
-              <a:latin typeface="Times New Roman" panose="02020603050405020304" pitchFamily="18" charset="0"/>
-              <a:cs typeface="Times New Roman" panose="02020603050405020304" pitchFamily="18" charset="0"/>
-            </a:endParaRPr>
-          </a:p>
-          <a:p>
-            <a:pPr algn="just"/>
-            <a:r>
-              <a:rPr lang="en-US" sz="1700" dirty="0">
-                <a:latin typeface="Times New Roman" panose="02020603050405020304" pitchFamily="18" charset="0"/>
-                <a:cs typeface="Times New Roman" panose="02020603050405020304" pitchFamily="18" charset="0"/>
-              </a:rPr>
-              <a:t>The </a:t>
-            </a:r>
-            <a:r>
-              <a:rPr lang="en-US" sz="1700" b="1" dirty="0">
-                <a:latin typeface="Times New Roman" panose="02020603050405020304" pitchFamily="18" charset="0"/>
-                <a:cs typeface="Times New Roman" panose="02020603050405020304" pitchFamily="18" charset="0"/>
-              </a:rPr>
-              <a:t>pie-chart</a:t>
-            </a:r>
-            <a:r>
-              <a:rPr lang="en-US" sz="1700" dirty="0">
-                <a:latin typeface="Times New Roman" panose="02020603050405020304" pitchFamily="18" charset="0"/>
-                <a:cs typeface="Times New Roman" panose="02020603050405020304" pitchFamily="18" charset="0"/>
-              </a:rPr>
-              <a:t> (situated within the probability information circle) conveys the probability of winning the amount depicted in the </a:t>
-            </a:r>
-            <a:r>
-              <a:rPr lang="en-US" sz="1700" b="1" dirty="0">
-                <a:latin typeface="Times New Roman" panose="02020603050405020304" pitchFamily="18" charset="0"/>
-                <a:cs typeface="Times New Roman" panose="02020603050405020304" pitchFamily="18" charset="0"/>
-              </a:rPr>
-              <a:t>amount bar </a:t>
-            </a:r>
-            <a:r>
-              <a:rPr lang="en-US" sz="1700" dirty="0">
-                <a:latin typeface="Times New Roman" panose="02020603050405020304" pitchFamily="18" charset="0"/>
-                <a:cs typeface="Times New Roman" panose="02020603050405020304" pitchFamily="18" charset="0"/>
-              </a:rPr>
-              <a:t>(situated within the amount circle).</a:t>
+              <a:t>The example below shows that if you choose the yellow option, you may win 30 British pence.</a:t>
             </a:r>
           </a:p>
         </p:txBody>
       </p:sp>
       <p:pic>
         <p:nvPicPr>
-          <p:cNvPr id="2" name="Content Placeholder 4" descr="Graphical user interface, text, application&#10;&#10;Description automatically generated">
+          <p:cNvPr id="6" name="Content Placeholder 5" descr="Icon&#10;&#10;Description automatically generated">
             <a:extLst>
               <a:ext uri="{FF2B5EF4-FFF2-40B4-BE49-F238E27FC236}">
-                <a16:creationId xmlns:a16="http://schemas.microsoft.com/office/drawing/2014/main" id="{08308C14-F1FB-FCC2-E2D3-DE0764DA7404}"/>
+                <a16:creationId xmlns:a16="http://schemas.microsoft.com/office/drawing/2014/main" id="{40154928-12A9-C3AF-F238-7FFCF5A42EAD}"/>
               </a:ext>
             </a:extLst>
           </p:cNvPr>
@@ -5088,22 +5497,229 @@
             <p:ph idx="1"/>
           </p:nvPr>
         </p:nvPicPr>
+        <p:blipFill>
+          <a:blip r:embed="rId2"/>
+          <a:stretch>
+            <a:fillRect/>
+          </a:stretch>
+        </p:blipFill>
+        <p:spPr>
+          <a:xfrm>
+            <a:off x="5146431" y="3185834"/>
+            <a:ext cx="2743818" cy="2331130"/>
+          </a:xfrm>
+        </p:spPr>
+      </p:pic>
+      <p:pic>
+        <p:nvPicPr>
+          <p:cNvPr id="7" name="Picture 2" descr="Ever wonder why your mouse cursor is slanted? | by ajiitha | Prototypr">
+            <a:extLst>
+              <a:ext uri="{FF2B5EF4-FFF2-40B4-BE49-F238E27FC236}">
+                <a16:creationId xmlns:a16="http://schemas.microsoft.com/office/drawing/2014/main" id="{7950EB2B-0448-7182-11AB-007ECBF027C4}"/>
+              </a:ext>
+            </a:extLst>
+          </p:cNvPr>
+          <p:cNvPicPr>
+            <a:picLocks noChangeAspect="1" noChangeArrowheads="1"/>
+          </p:cNvPicPr>
+          <p:nvPr/>
+        </p:nvPicPr>
+        <p:blipFill>
+          <a:blip r:embed="rId3">
+            <a:extLst>
+              <a:ext uri="{28A0092B-C50C-407E-A947-70E740481C1C}">
+                <a14:useLocalDpi xmlns:a14="http://schemas.microsoft.com/office/drawing/2010/main" val="0"/>
+              </a:ext>
+            </a:extLst>
+          </a:blip>
+          <a:srcRect/>
+          <a:stretch>
+            <a:fillRect/>
+          </a:stretch>
+        </p:blipFill>
+        <p:spPr bwMode="auto">
+          <a:xfrm>
+            <a:off x="7068531" y="4709637"/>
+            <a:ext cx="254000" cy="362857"/>
+          </a:xfrm>
+          <a:prstGeom prst="rect">
+            <a:avLst/>
+          </a:prstGeom>
+          <a:noFill/>
+          <a:extLst>
+            <a:ext uri="{909E8E84-426E-40DD-AFC4-6F175D3DCCD1}">
+              <a14:hiddenFill xmlns:a14="http://schemas.microsoft.com/office/drawing/2010/main">
+                <a:solidFill>
+                  <a:srgbClr val="FFFFFF"/>
+                </a:solidFill>
+              </a14:hiddenFill>
+            </a:ext>
+          </a:extLst>
+        </p:spPr>
+      </p:pic>
+      <p:pic>
+        <p:nvPicPr>
+          <p:cNvPr id="8" name="Picture 7" descr="A picture containing shape&#10;&#10;Description automatically generated">
+            <a:extLst>
+              <a:ext uri="{FF2B5EF4-FFF2-40B4-BE49-F238E27FC236}">
+                <a16:creationId xmlns:a16="http://schemas.microsoft.com/office/drawing/2014/main" id="{C743098C-DD01-32D9-0A9F-E8466E1CB1A8}"/>
+              </a:ext>
+            </a:extLst>
+          </p:cNvPr>
+          <p:cNvPicPr>
+            <a:picLocks noChangeAspect="1"/>
+          </p:cNvPicPr>
+          <p:nvPr/>
+        </p:nvPicPr>
         <p:blipFill rotWithShape="1">
-          <a:blip r:embed="rId2"/>
-          <a:srcRect l="11329" t="45919" r="68141" b="22512"/>
+          <a:blip r:embed="rId4"/>
+          <a:srcRect l="62040" t="688" r="7723" b="65846"/>
           <a:stretch/>
         </p:blipFill>
         <p:spPr>
           <a:xfrm>
-            <a:off x="1122947" y="3946844"/>
-            <a:ext cx="6306450" cy="2727477"/>
-          </a:xfrm>
+            <a:off x="1563180" y="3159544"/>
+            <a:ext cx="2421975" cy="2308324"/>
+          </a:xfrm>
+          <a:prstGeom prst="rect">
+            <a:avLst/>
+          </a:prstGeom>
         </p:spPr>
       </p:pic>
+      <p:pic>
+        <p:nvPicPr>
+          <p:cNvPr id="10" name="Picture 2" descr="Ever wonder why your mouse cursor is slanted? | by ajiitha | Prototypr">
+            <a:extLst>
+              <a:ext uri="{FF2B5EF4-FFF2-40B4-BE49-F238E27FC236}">
+                <a16:creationId xmlns:a16="http://schemas.microsoft.com/office/drawing/2014/main" id="{B079D37E-E813-C485-3A2D-2BDD39FC63C5}"/>
+              </a:ext>
+            </a:extLst>
+          </p:cNvPr>
+          <p:cNvPicPr>
+            <a:picLocks noChangeAspect="1" noChangeArrowheads="1"/>
+          </p:cNvPicPr>
+          <p:nvPr/>
+        </p:nvPicPr>
+        <p:blipFill>
+          <a:blip r:embed="rId3">
+            <a:extLst>
+              <a:ext uri="{28A0092B-C50C-407E-A947-70E740481C1C}">
+                <a14:useLocalDpi xmlns:a14="http://schemas.microsoft.com/office/drawing/2010/main" val="0"/>
+              </a:ext>
+            </a:extLst>
+          </a:blip>
+          <a:srcRect/>
+          <a:stretch>
+            <a:fillRect/>
+          </a:stretch>
+        </p:blipFill>
+        <p:spPr bwMode="auto">
+          <a:xfrm>
+            <a:off x="3489728" y="5467868"/>
+            <a:ext cx="254000" cy="362857"/>
+          </a:xfrm>
+          <a:prstGeom prst="rect">
+            <a:avLst/>
+          </a:prstGeom>
+          <a:noFill/>
+          <a:extLst>
+            <a:ext uri="{909E8E84-426E-40DD-AFC4-6F175D3DCCD1}">
+              <a14:hiddenFill xmlns:a14="http://schemas.microsoft.com/office/drawing/2010/main">
+                <a:solidFill>
+                  <a:srgbClr val="FFFFFF"/>
+                </a:solidFill>
+              </a14:hiddenFill>
+            </a:ext>
+          </a:extLst>
+        </p:spPr>
+      </p:pic>
+      <p:sp>
+        <p:nvSpPr>
+          <p:cNvPr id="12" name="TextBox 11">
+            <a:extLst>
+              <a:ext uri="{FF2B5EF4-FFF2-40B4-BE49-F238E27FC236}">
+                <a16:creationId xmlns:a16="http://schemas.microsoft.com/office/drawing/2014/main" id="{13F66059-97F5-025D-9CA7-1B11624AB6D2}"/>
+              </a:ext>
+            </a:extLst>
+          </p:cNvPr>
+          <p:cNvSpPr txBox="1"/>
+          <p:nvPr/>
+        </p:nvSpPr>
+        <p:spPr>
+          <a:xfrm>
+            <a:off x="0" y="6000270"/>
+            <a:ext cx="9144000" cy="369332"/>
+          </a:xfrm>
+          <a:prstGeom prst="rect">
+            <a:avLst/>
+          </a:prstGeom>
+          <a:noFill/>
+        </p:spPr>
+        <p:txBody>
+          <a:bodyPr wrap="square" rtlCol="0">
+            <a:spAutoFit/>
+          </a:bodyPr>
+          <a:lstStyle/>
+          <a:p>
+            <a:pPr algn="ctr"/>
+            <a:r>
+              <a:rPr lang="en-BE" dirty="0">
+                <a:latin typeface="Times New Roman" panose="02020603050405020304" pitchFamily="18" charset="0"/>
+                <a:cs typeface="Times New Roman" panose="02020603050405020304" pitchFamily="18" charset="0"/>
+              </a:rPr>
+              <a:t>Move the cursor inside an amount circle to see how much you may win</a:t>
+            </a:r>
+          </a:p>
+        </p:txBody>
+      </p:sp>
+      <p:cxnSp>
+        <p:nvCxnSpPr>
+          <p:cNvPr id="14" name="Straight Arrow Connector 13">
+            <a:extLst>
+              <a:ext uri="{FF2B5EF4-FFF2-40B4-BE49-F238E27FC236}">
+                <a16:creationId xmlns:a16="http://schemas.microsoft.com/office/drawing/2014/main" id="{BABC9E6F-ECE7-6137-1F38-4879BFA7E9A6}"/>
+              </a:ext>
+            </a:extLst>
+          </p:cNvPr>
+          <p:cNvCxnSpPr/>
+          <p:nvPr/>
+        </p:nvCxnSpPr>
+        <p:spPr>
+          <a:xfrm>
+            <a:off x="4232031" y="4290646"/>
+            <a:ext cx="914400" cy="0"/>
+          </a:xfrm>
+          <a:prstGeom prst="straightConnector1">
+            <a:avLst/>
+          </a:prstGeom>
+          <a:ln>
+            <a:solidFill>
+              <a:schemeClr val="tx1"/>
+            </a:solidFill>
+            <a:headEnd type="triangle"/>
+            <a:tailEnd type="triangle"/>
+          </a:ln>
+          <a:effectLst/>
+        </p:spPr>
+        <p:style>
+          <a:lnRef idx="2">
+            <a:schemeClr val="accent1"/>
+          </a:lnRef>
+          <a:fillRef idx="0">
+            <a:schemeClr val="accent1"/>
+          </a:fillRef>
+          <a:effectRef idx="1">
+            <a:schemeClr val="accent1"/>
+          </a:effectRef>
+          <a:fontRef idx="minor">
+            <a:schemeClr val="tx1"/>
+          </a:fontRef>
+        </p:style>
+      </p:cxnSp>
     </p:spTree>
     <p:extLst>
       <p:ext uri="{BB962C8B-B14F-4D97-AF65-F5344CB8AC3E}">
-        <p14:creationId xmlns:p14="http://schemas.microsoft.com/office/powerpoint/2010/main" val="499189277"/>
+        <p14:creationId xmlns:p14="http://schemas.microsoft.com/office/powerpoint/2010/main" val="1977645922"/>
       </p:ext>
     </p:extLst>
   </p:cSld>
@@ -5132,10 +5748,10 @@
       </p:grpSpPr>
       <p:sp>
         <p:nvSpPr>
-          <p:cNvPr id="4" name="TextBox 3">
+          <p:cNvPr id="9" name="TextBox 8">
             <a:extLst>
               <a:ext uri="{FF2B5EF4-FFF2-40B4-BE49-F238E27FC236}">
-                <a16:creationId xmlns:a16="http://schemas.microsoft.com/office/drawing/2014/main" id="{488853E7-71EB-9638-27FC-1F1BE5858164}"/>
+                <a16:creationId xmlns:a16="http://schemas.microsoft.com/office/drawing/2014/main" id="{52250469-1D36-D9EA-58D9-DFBCCD3F2574}"/>
               </a:ext>
             </a:extLst>
           </p:cNvPr>
@@ -5144,8 +5760,8 @@
         </p:nvSpPr>
         <p:spPr>
           <a:xfrm>
-            <a:off x="529119" y="4427376"/>
-            <a:ext cx="8085762" cy="923330"/>
+            <a:off x="529119" y="827367"/>
+            <a:ext cx="8085762" cy="1661993"/>
           </a:xfrm>
           <a:prstGeom prst="rect">
             <a:avLst/>
@@ -5160,49 +5776,81 @@
           <a:p>
             <a:pPr algn="just"/>
             <a:r>
-              <a:rPr lang="en-US" dirty="0">
-                <a:latin typeface="Times New Roman" panose="02020603050405020304" pitchFamily="18" charset="0"/>
-                <a:cs typeface="Times New Roman" panose="02020603050405020304" pitchFamily="18" charset="0"/>
-              </a:rPr>
-              <a:t>To chose a gamble of your choice click on the buttons presented in the middle of the screen in Blue </a:t>
-            </a:r>
-            <a:r>
-              <a:rPr lang="en-US" b="1" dirty="0">
-                <a:latin typeface="Times New Roman" panose="02020603050405020304" pitchFamily="18" charset="0"/>
-                <a:cs typeface="Times New Roman" panose="02020603050405020304" pitchFamily="18" charset="0"/>
-              </a:rPr>
-              <a:t>(for selecting Blue gamble) </a:t>
-            </a:r>
-            <a:r>
-              <a:rPr lang="en-US" dirty="0">
-                <a:latin typeface="Times New Roman" panose="02020603050405020304" pitchFamily="18" charset="0"/>
-                <a:cs typeface="Times New Roman" panose="02020603050405020304" pitchFamily="18" charset="0"/>
-              </a:rPr>
-              <a:t>and Yellow </a:t>
-            </a:r>
-            <a:r>
-              <a:rPr lang="en-US" b="1" dirty="0">
-                <a:latin typeface="Times New Roman" panose="02020603050405020304" pitchFamily="18" charset="0"/>
-                <a:cs typeface="Times New Roman" panose="02020603050405020304" pitchFamily="18" charset="0"/>
-              </a:rPr>
-              <a:t>(for selecting the Yellow gamble)</a:t>
-            </a:r>
-            <a:r>
-              <a:rPr lang="en-US" dirty="0">
-                <a:latin typeface="Times New Roman" panose="02020603050405020304" pitchFamily="18" charset="0"/>
-                <a:cs typeface="Times New Roman" panose="02020603050405020304" pitchFamily="18" charset="0"/>
-              </a:rPr>
-              <a:t>.</a:t>
+              <a:rPr lang="en-US" sz="1700" dirty="0">
+                <a:latin typeface="Times New Roman" panose="02020603050405020304" pitchFamily="18" charset="0"/>
+                <a:cs typeface="Times New Roman" panose="02020603050405020304" pitchFamily="18" charset="0"/>
+              </a:rPr>
+              <a:t>Similarly, when you </a:t>
+            </a:r>
+            <a:r>
+              <a:rPr lang="en-US" sz="1700" b="1" dirty="0">
+                <a:latin typeface="Times New Roman" panose="02020603050405020304" pitchFamily="18" charset="0"/>
+                <a:cs typeface="Times New Roman" panose="02020603050405020304" pitchFamily="18" charset="0"/>
+              </a:rPr>
+              <a:t>move the mouse cursor inside the probability circle, </a:t>
+            </a:r>
+            <a:r>
+              <a:rPr lang="en-US" sz="1700" dirty="0">
+                <a:latin typeface="Times New Roman" panose="02020603050405020304" pitchFamily="18" charset="0"/>
+                <a:cs typeface="Times New Roman" panose="02020603050405020304" pitchFamily="18" charset="0"/>
+              </a:rPr>
+              <a:t>you will see a gray pie-chart, with part of it colored green. The larger the green part, the higher your chance of winning.</a:t>
+            </a:r>
+          </a:p>
+          <a:p>
+            <a:pPr algn="just"/>
+            <a:endParaRPr lang="en-US" sz="1700" dirty="0">
+              <a:latin typeface="Times New Roman" panose="02020603050405020304" pitchFamily="18" charset="0"/>
+              <a:cs typeface="Times New Roman" panose="02020603050405020304" pitchFamily="18" charset="0"/>
+            </a:endParaRPr>
+          </a:p>
+          <a:p>
+            <a:pPr algn="just"/>
+            <a:r>
+              <a:rPr lang="en-US" sz="1700" dirty="0">
+                <a:latin typeface="Times New Roman" panose="02020603050405020304" pitchFamily="18" charset="0"/>
+                <a:cs typeface="Times New Roman" panose="02020603050405020304" pitchFamily="18" charset="0"/>
+              </a:rPr>
+              <a:t>The example below shows that if you choose the yellow option, you have about 60% chance of winning.</a:t>
             </a:r>
           </a:p>
         </p:txBody>
       </p:sp>
       <p:pic>
         <p:nvPicPr>
-          <p:cNvPr id="5" name="Picture 4" descr="Chart, bubble chart&#10;&#10;Description automatically generated">
+          <p:cNvPr id="11" name="Content Placeholder 10" descr="A picture containing chart&#10;&#10;Description automatically generated">
             <a:extLst>
               <a:ext uri="{FF2B5EF4-FFF2-40B4-BE49-F238E27FC236}">
-                <a16:creationId xmlns:a16="http://schemas.microsoft.com/office/drawing/2014/main" id="{DCA673F1-D624-2B59-1DF5-E0C41CEF8CBA}"/>
+                <a16:creationId xmlns:a16="http://schemas.microsoft.com/office/drawing/2014/main" id="{FB6EF21A-1D6D-1EA8-CE9F-512468CAF65C}"/>
+              </a:ext>
+            </a:extLst>
+          </p:cNvPr>
+          <p:cNvPicPr>
+            <a:picLocks noGrp="1" noChangeAspect="1"/>
+          </p:cNvPicPr>
+          <p:nvPr>
+            <p:ph idx="1"/>
+          </p:nvPr>
+        </p:nvPicPr>
+        <p:blipFill>
+          <a:blip r:embed="rId2"/>
+          <a:stretch>
+            <a:fillRect/>
+          </a:stretch>
+        </p:blipFill>
+        <p:spPr>
+          <a:xfrm>
+            <a:off x="5329966" y="2948405"/>
+            <a:ext cx="2448512" cy="2604544"/>
+          </a:xfrm>
+        </p:spPr>
+      </p:pic>
+      <p:pic>
+        <p:nvPicPr>
+          <p:cNvPr id="12" name="Picture 11" descr="Chart, bubble chart&#10;&#10;Description automatically generated">
+            <a:extLst>
+              <a:ext uri="{FF2B5EF4-FFF2-40B4-BE49-F238E27FC236}">
+                <a16:creationId xmlns:a16="http://schemas.microsoft.com/office/drawing/2014/main" id="{C366117D-2F62-F1EB-6C49-DAACF71CECD9}"/>
               </a:ext>
             </a:extLst>
           </p:cNvPr>
@@ -5212,14 +5860,14 @@
           <p:nvPr/>
         </p:nvPicPr>
         <p:blipFill rotWithShape="1">
-          <a:blip r:embed="rId2"/>
-          <a:srcRect l="28452" t="21848" r="31213" b="17071"/>
+          <a:blip r:embed="rId3"/>
+          <a:srcRect l="29678" t="21304" r="57250" b="57653"/>
           <a:stretch/>
         </p:blipFill>
         <p:spPr>
           <a:xfrm>
-            <a:off x="2484935" y="461863"/>
-            <a:ext cx="3997729" cy="3783566"/>
+            <a:off x="1500554" y="3094697"/>
+            <a:ext cx="2431724" cy="2446528"/>
           </a:xfrm>
           <a:prstGeom prst="rect">
             <a:avLst/>
@@ -5228,10 +5876,10 @@
       </p:pic>
       <p:pic>
         <p:nvPicPr>
-          <p:cNvPr id="6" name="Picture 6" descr="Free Click Icon, Symbol. PNG, SVG Download.">
+          <p:cNvPr id="14" name="Picture 2" descr="Ever wonder why your mouse cursor is slanted? | by ajiitha | Prototypr">
             <a:extLst>
               <a:ext uri="{FF2B5EF4-FFF2-40B4-BE49-F238E27FC236}">
-                <a16:creationId xmlns:a16="http://schemas.microsoft.com/office/drawing/2014/main" id="{252671CA-CC7C-6DE6-1E6C-0089D6A826F6}"/>
+                <a16:creationId xmlns:a16="http://schemas.microsoft.com/office/drawing/2014/main" id="{90E0C1B9-6B91-97A9-DEBA-176672B5C6A9}"/>
               </a:ext>
             </a:extLst>
           </p:cNvPr>
@@ -5241,7 +5889,7 @@
           <p:nvPr/>
         </p:nvPicPr>
         <p:blipFill>
-          <a:blip r:embed="rId3">
+          <a:blip r:embed="rId4">
             <a:extLst>
               <a:ext uri="{28A0092B-C50C-407E-A947-70E740481C1C}">
                 <a14:useLocalDpi xmlns:a14="http://schemas.microsoft.com/office/drawing/2010/main" val="0"/>
@@ -5254,9 +5902,9 @@
           </a:stretch>
         </p:blipFill>
         <p:spPr bwMode="auto">
-          <a:xfrm rot="19638701">
-            <a:off x="4042986" y="2318715"/>
-            <a:ext cx="517385" cy="517385"/>
+          <a:xfrm>
+            <a:off x="7000397" y="4940390"/>
+            <a:ext cx="254000" cy="362857"/>
           </a:xfrm>
           <a:prstGeom prst="rect">
             <a:avLst/>
@@ -5273,10 +5921,140 @@
           </a:extLst>
         </p:spPr>
       </p:pic>
+      <p:pic>
+        <p:nvPicPr>
+          <p:cNvPr id="5" name="Picture 2" descr="Ever wonder why your mouse cursor is slanted? | by ajiitha | Prototypr">
+            <a:extLst>
+              <a:ext uri="{FF2B5EF4-FFF2-40B4-BE49-F238E27FC236}">
+                <a16:creationId xmlns:a16="http://schemas.microsoft.com/office/drawing/2014/main" id="{5A9DE90C-DECD-487B-C691-FDE9B5F9F294}"/>
+              </a:ext>
+            </a:extLst>
+          </p:cNvPr>
+          <p:cNvPicPr>
+            <a:picLocks noChangeAspect="1" noChangeArrowheads="1"/>
+          </p:cNvPicPr>
+          <p:nvPr/>
+        </p:nvPicPr>
+        <p:blipFill>
+          <a:blip r:embed="rId4">
+            <a:extLst>
+              <a:ext uri="{28A0092B-C50C-407E-A947-70E740481C1C}">
+                <a14:useLocalDpi xmlns:a14="http://schemas.microsoft.com/office/drawing/2010/main" val="0"/>
+              </a:ext>
+            </a:extLst>
+          </a:blip>
+          <a:srcRect/>
+          <a:stretch>
+            <a:fillRect/>
+          </a:stretch>
+        </p:blipFill>
+        <p:spPr bwMode="auto">
+          <a:xfrm>
+            <a:off x="3431113" y="5385806"/>
+            <a:ext cx="254000" cy="362857"/>
+          </a:xfrm>
+          <a:prstGeom prst="rect">
+            <a:avLst/>
+          </a:prstGeom>
+          <a:noFill/>
+          <a:extLst>
+            <a:ext uri="{909E8E84-426E-40DD-AFC4-6F175D3DCCD1}">
+              <a14:hiddenFill xmlns:a14="http://schemas.microsoft.com/office/drawing/2010/main">
+                <a:solidFill>
+                  <a:srgbClr val="FFFFFF"/>
+                </a:solidFill>
+              </a14:hiddenFill>
+            </a:ext>
+          </a:extLst>
+        </p:spPr>
+      </p:pic>
+      <p:sp>
+        <p:nvSpPr>
+          <p:cNvPr id="7" name="TextBox 6">
+            <a:extLst>
+              <a:ext uri="{FF2B5EF4-FFF2-40B4-BE49-F238E27FC236}">
+                <a16:creationId xmlns:a16="http://schemas.microsoft.com/office/drawing/2014/main" id="{ED20EA09-3BBF-E5D0-4671-3C3EBCB7D97F}"/>
+              </a:ext>
+            </a:extLst>
+          </p:cNvPr>
+          <p:cNvSpPr txBox="1"/>
+          <p:nvPr/>
+        </p:nvSpPr>
+        <p:spPr>
+          <a:xfrm>
+            <a:off x="0" y="6000270"/>
+            <a:ext cx="9144000" cy="369332"/>
+          </a:xfrm>
+          <a:prstGeom prst="rect">
+            <a:avLst/>
+          </a:prstGeom>
+          <a:noFill/>
+        </p:spPr>
+        <p:txBody>
+          <a:bodyPr wrap="square" rtlCol="0">
+            <a:spAutoFit/>
+          </a:bodyPr>
+          <a:lstStyle/>
+          <a:p>
+            <a:pPr algn="ctr"/>
+            <a:r>
+              <a:rPr lang="en-BE" dirty="0">
+                <a:latin typeface="Times New Roman" panose="02020603050405020304" pitchFamily="18" charset="0"/>
+                <a:cs typeface="Times New Roman" panose="02020603050405020304" pitchFamily="18" charset="0"/>
+              </a:rPr>
+              <a:t>Move the cursor inside a probability circle to see the chance of winning</a:t>
+            </a:r>
+          </a:p>
+        </p:txBody>
+      </p:sp>
+      <p:cxnSp>
+        <p:nvCxnSpPr>
+          <p:cNvPr id="8" name="Straight Arrow Connector 7">
+            <a:extLst>
+              <a:ext uri="{FF2B5EF4-FFF2-40B4-BE49-F238E27FC236}">
+                <a16:creationId xmlns:a16="http://schemas.microsoft.com/office/drawing/2014/main" id="{410B3911-E09A-1BC7-947C-47AD456EB05D}"/>
+              </a:ext>
+            </a:extLst>
+          </p:cNvPr>
+          <p:cNvCxnSpPr/>
+          <p:nvPr/>
+        </p:nvCxnSpPr>
+        <p:spPr>
+          <a:xfrm>
+            <a:off x="4091354" y="4255477"/>
+            <a:ext cx="914400" cy="0"/>
+          </a:xfrm>
+          <a:prstGeom prst="straightConnector1">
+            <a:avLst/>
+          </a:prstGeom>
+          <a:ln>
+            <a:solidFill>
+              <a:schemeClr val="tx1"/>
+            </a:solidFill>
+            <a:headEnd type="triangle"/>
+            <a:tailEnd type="triangle"/>
+          </a:ln>
+          <a:effectLst/>
+        </p:spPr>
+        <p:style>
+          <a:lnRef idx="2">
+            <a:schemeClr val="accent1"/>
+          </a:lnRef>
+          <a:fillRef idx="0">
+            <a:schemeClr val="accent1"/>
+          </a:fillRef>
+          <a:effectRef idx="1">
+            <a:schemeClr val="accent1"/>
+          </a:effectRef>
+          <a:fontRef idx="minor">
+            <a:schemeClr val="tx1"/>
+          </a:fontRef>
+        </p:style>
+      </p:cxnSp>
     </p:spTree>
     <p:extLst>
       <p:ext uri="{BB962C8B-B14F-4D97-AF65-F5344CB8AC3E}">
-        <p14:creationId xmlns:p14="http://schemas.microsoft.com/office/powerpoint/2010/main" val="2871051257"/>
+        <p14:creationId xmlns:p14="http://schemas.microsoft.com/office/powerpoint/2010/main" val="499189277"/>
       </p:ext>
     </p:extLst>
   </p:cSld>
@@ -5305,10 +6083,10 @@
       </p:grpSpPr>
       <p:sp>
         <p:nvSpPr>
-          <p:cNvPr id="6" name="TextBox 5">
+          <p:cNvPr id="5" name="TextBox 4">
             <a:extLst>
               <a:ext uri="{FF2B5EF4-FFF2-40B4-BE49-F238E27FC236}">
-                <a16:creationId xmlns:a16="http://schemas.microsoft.com/office/drawing/2014/main" id="{4E76F532-0E70-BD79-81FA-4EA2444AE451}"/>
+                <a16:creationId xmlns:a16="http://schemas.microsoft.com/office/drawing/2014/main" id="{49B934B8-BED6-070F-B5EF-EB2F3C643E26}"/>
               </a:ext>
             </a:extLst>
           </p:cNvPr>
@@ -5317,8 +6095,8 @@
         </p:nvSpPr>
         <p:spPr>
           <a:xfrm>
-            <a:off x="470694" y="285891"/>
-            <a:ext cx="8085762" cy="2862322"/>
+            <a:off x="416169" y="647652"/>
+            <a:ext cx="8311661" cy="2031325"/>
           </a:xfrm>
           <a:prstGeom prst="rect">
             <a:avLst/>
@@ -5326,32 +6104,18 @@
           <a:noFill/>
         </p:spPr>
         <p:txBody>
-          <a:bodyPr wrap="square" rtlCol="0">
+          <a:bodyPr wrap="square">
             <a:spAutoFit/>
           </a:bodyPr>
           <a:lstStyle/>
           <a:p>
             <a:pPr algn="just"/>
             <a:r>
-              <a:rPr lang="en-US" dirty="0">
-                <a:latin typeface="Times New Roman" panose="02020603050405020304" pitchFamily="18" charset="0"/>
-                <a:cs typeface="Times New Roman" panose="02020603050405020304" pitchFamily="18" charset="0"/>
-              </a:rPr>
-              <a:t>Following clicking on a gamble of your choice you will be directed to a screen in which you will view the probability and amount information of the chosen gamble. Upon landing on this page, the pie-chart will spin for approximately 1500 </a:t>
-            </a:r>
-            <a:r>
-              <a:rPr lang="en-US" dirty="0" err="1">
-                <a:latin typeface="Times New Roman" panose="02020603050405020304" pitchFamily="18" charset="0"/>
-                <a:cs typeface="Times New Roman" panose="02020603050405020304" pitchFamily="18" charset="0"/>
-              </a:rPr>
-              <a:t>ms.</a:t>
-            </a:r>
-            <a:r>
-              <a:rPr lang="en-US" dirty="0">
-                <a:latin typeface="Times New Roman" panose="02020603050405020304" pitchFamily="18" charset="0"/>
-                <a:cs typeface="Times New Roman" panose="02020603050405020304" pitchFamily="18" charset="0"/>
-              </a:rPr>
-              <a:t> Once the pie-chart stops spinning if the colored part is under the arrow (e.g., Fig 2) then you will have incurred a win corresponding to the amount indicated in the amount bar. </a:t>
+              <a:rPr lang="en-US" sz="1800" dirty="0">
+                <a:latin typeface="Times New Roman" panose="02020603050405020304" pitchFamily="18" charset="0"/>
+                <a:cs typeface="Times New Roman" panose="02020603050405020304" pitchFamily="18" charset="0"/>
+              </a:rPr>
+              <a:t>Together, in this example, if you choose the yellow option, you will have a 60% chance of winning 30 British pence (see below).</a:t>
             </a:r>
           </a:p>
           <a:p>
@@ -5364,169 +6128,52 @@
           <a:p>
             <a:pPr algn="just"/>
             <a:r>
+              <a:rPr lang="en-US" sz="1800" dirty="0">
+                <a:latin typeface="Times New Roman" panose="02020603050405020304" pitchFamily="18" charset="0"/>
+                <a:cs typeface="Times New Roman" panose="02020603050405020304" pitchFamily="18" charset="0"/>
+              </a:rPr>
+              <a:t>The blue option will have a different chance of winning a different amount. </a:t>
+            </a:r>
+            <a:r>
               <a:rPr lang="en-US" dirty="0">
                 <a:latin typeface="Times New Roman" panose="02020603050405020304" pitchFamily="18" charset="0"/>
                 <a:cs typeface="Times New Roman" panose="02020603050405020304" pitchFamily="18" charset="0"/>
               </a:rPr>
-              <a:t>Contrarily, if the pie-chart stops with the white part is under the arrow (e.g., Fig 1) then you will have incurred no wins (i.e., the amount indicated in the amount bar will not be added to your total). </a:t>
-            </a:r>
-          </a:p>
-        </p:txBody>
-      </p:sp>
-      <p:sp>
-        <p:nvSpPr>
-          <p:cNvPr id="7" name="TextBox 6">
-            <a:extLst>
-              <a:ext uri="{FF2B5EF4-FFF2-40B4-BE49-F238E27FC236}">
-                <a16:creationId xmlns:a16="http://schemas.microsoft.com/office/drawing/2014/main" id="{D9D66287-7BBC-DD63-8A4D-86615AC5AE8F}"/>
-              </a:ext>
-            </a:extLst>
-          </p:cNvPr>
-          <p:cNvSpPr txBox="1"/>
-          <p:nvPr/>
-        </p:nvSpPr>
-        <p:spPr>
-          <a:xfrm>
-            <a:off x="1093772" y="5308715"/>
-            <a:ext cx="2887801" cy="523220"/>
-          </a:xfrm>
-          <a:prstGeom prst="rect">
-            <a:avLst/>
-          </a:prstGeom>
-          <a:noFill/>
-        </p:spPr>
-        <p:txBody>
-          <a:bodyPr wrap="square" rtlCol="0">
-            <a:spAutoFit/>
-          </a:bodyPr>
-          <a:lstStyle/>
-          <a:p>
-            <a:pPr algn="ctr"/>
-            <a:r>
-              <a:rPr lang="en-US" sz="1400" dirty="0">
-                <a:latin typeface="Times New Roman" panose="02020603050405020304" pitchFamily="18" charset="0"/>
-                <a:cs typeface="Times New Roman" panose="02020603050405020304" pitchFamily="18" charset="0"/>
-              </a:rPr>
-              <a:t>Fig. 1: No Win</a:t>
-            </a:r>
-            <a:r>
-              <a:rPr lang="en-US" sz="1400" dirty="0">
-                <a:latin typeface="Times New Roman" panose="02020603050405020304" pitchFamily="18" charset="0"/>
-                <a:cs typeface="Times New Roman" panose="02020603050405020304" pitchFamily="18" charset="0"/>
-                <a:sym typeface="Wingdings" pitchFamily="2" charset="2"/>
-              </a:rPr>
-              <a:t> Outcome</a:t>
-            </a:r>
-          </a:p>
-          <a:p>
-            <a:pPr algn="ctr"/>
-            <a:endParaRPr lang="en-US" sz="1400" dirty="0">
+              <a:t>You can see the amount and probability of the blue option in the same way.</a:t>
+            </a:r>
+          </a:p>
+          <a:p>
+            <a:pPr algn="just"/>
+            <a:endParaRPr lang="en-US" sz="1800" dirty="0">
               <a:latin typeface="Times New Roman" panose="02020603050405020304" pitchFamily="18" charset="0"/>
               <a:cs typeface="Times New Roman" panose="02020603050405020304" pitchFamily="18" charset="0"/>
             </a:endParaRPr>
           </a:p>
-        </p:txBody>
-      </p:sp>
-      <p:sp>
-        <p:nvSpPr>
-          <p:cNvPr id="10" name="TextBox 9">
+          <a:p>
+            <a:pPr algn="just"/>
+            <a:r>
+              <a:rPr lang="en-US" b="1" dirty="0">
+                <a:latin typeface="Times New Roman" panose="02020603050405020304" pitchFamily="18" charset="0"/>
+                <a:cs typeface="Times New Roman" panose="02020603050405020304" pitchFamily="18" charset="0"/>
+              </a:rPr>
+              <a:t>You can</a:t>
+            </a:r>
+            <a:r>
+              <a:rPr lang="en-US" sz="1800" b="1" dirty="0">
+                <a:latin typeface="Times New Roman" panose="02020603050405020304" pitchFamily="18" charset="0"/>
+                <a:cs typeface="Times New Roman" panose="02020603050405020304" pitchFamily="18" charset="0"/>
+              </a:rPr>
+              <a:t> move the mouse cursor inside the circles for as many times as you want.</a:t>
+            </a:r>
+          </a:p>
+        </p:txBody>
+      </p:sp>
+      <p:pic>
+        <p:nvPicPr>
+          <p:cNvPr id="6" name="Content Placeholder 5" descr="Icon&#10;&#10;Description automatically generated">
             <a:extLst>
               <a:ext uri="{FF2B5EF4-FFF2-40B4-BE49-F238E27FC236}">
-                <a16:creationId xmlns:a16="http://schemas.microsoft.com/office/drawing/2014/main" id="{D84DFCAD-852A-0D60-32EA-0E821DACB585}"/>
-              </a:ext>
-            </a:extLst>
-          </p:cNvPr>
-          <p:cNvSpPr txBox="1"/>
-          <p:nvPr/>
-        </p:nvSpPr>
-        <p:spPr>
-          <a:xfrm>
-            <a:off x="5283244" y="5308715"/>
-            <a:ext cx="2887801" cy="307777"/>
-          </a:xfrm>
-          <a:prstGeom prst="rect">
-            <a:avLst/>
-          </a:prstGeom>
-          <a:noFill/>
-        </p:spPr>
-        <p:txBody>
-          <a:bodyPr wrap="square" rtlCol="0">
-            <a:spAutoFit/>
-          </a:bodyPr>
-          <a:lstStyle/>
-          <a:p>
-            <a:pPr algn="ctr"/>
-            <a:r>
-              <a:rPr lang="en-US" sz="1400" dirty="0">
-                <a:latin typeface="Times New Roman" panose="02020603050405020304" pitchFamily="18" charset="0"/>
-                <a:cs typeface="Times New Roman" panose="02020603050405020304" pitchFamily="18" charset="0"/>
-              </a:rPr>
-              <a:t>Fig. 2: Win</a:t>
-            </a:r>
-            <a:r>
-              <a:rPr lang="en-US" sz="1400" dirty="0">
-                <a:latin typeface="Times New Roman" panose="02020603050405020304" pitchFamily="18" charset="0"/>
-                <a:cs typeface="Times New Roman" panose="02020603050405020304" pitchFamily="18" charset="0"/>
-                <a:sym typeface="Wingdings" pitchFamily="2" charset="2"/>
-              </a:rPr>
-              <a:t> Outcome</a:t>
-            </a:r>
-          </a:p>
-        </p:txBody>
-      </p:sp>
-      <p:cxnSp>
-        <p:nvCxnSpPr>
-          <p:cNvPr id="12" name="Straight Connector 11">
-            <a:extLst>
-              <a:ext uri="{FF2B5EF4-FFF2-40B4-BE49-F238E27FC236}">
-                <a16:creationId xmlns:a16="http://schemas.microsoft.com/office/drawing/2014/main" id="{8B474852-E2C4-7FCA-6C04-E36B3D1AFC70}"/>
-              </a:ext>
-            </a:extLst>
-          </p:cNvPr>
-          <p:cNvCxnSpPr>
-            <a:cxnSpLocks/>
-          </p:cNvCxnSpPr>
-          <p:nvPr/>
-        </p:nvCxnSpPr>
-        <p:spPr>
-          <a:xfrm>
-            <a:off x="4592112" y="3142920"/>
-            <a:ext cx="0" cy="3225592"/>
-          </a:xfrm>
-          <a:prstGeom prst="line">
-            <a:avLst/>
-          </a:prstGeom>
-          <a:ln w="9525" cap="flat" cmpd="sng" algn="ctr">
-            <a:solidFill>
-              <a:schemeClr val="dk1"/>
-            </a:solidFill>
-            <a:prstDash val="dash"/>
-            <a:round/>
-            <a:headEnd type="none" w="med" len="med"/>
-            <a:tailEnd type="none" w="med" len="med"/>
-          </a:ln>
-        </p:spPr>
-        <p:style>
-          <a:lnRef idx="0">
-            <a:scrgbClr r="0" g="0" b="0"/>
-          </a:lnRef>
-          <a:fillRef idx="0">
-            <a:scrgbClr r="0" g="0" b="0"/>
-          </a:fillRef>
-          <a:effectRef idx="0">
-            <a:scrgbClr r="0" g="0" b="0"/>
-          </a:effectRef>
-          <a:fontRef idx="minor">
-            <a:schemeClr val="tx1"/>
-          </a:fontRef>
-        </p:style>
-      </p:cxnSp>
-      <p:pic>
-        <p:nvPicPr>
-          <p:cNvPr id="2" name="Content Placeholder 4" descr="Graphical user interface, text, application&#10;&#10;Description automatically generated">
-            <a:extLst>
-              <a:ext uri="{FF2B5EF4-FFF2-40B4-BE49-F238E27FC236}">
-                <a16:creationId xmlns:a16="http://schemas.microsoft.com/office/drawing/2014/main" id="{7FE46D72-FF26-D86B-D364-803636B04258}"/>
+                <a16:creationId xmlns:a16="http://schemas.microsoft.com/office/drawing/2014/main" id="{625985AE-3EB1-7D41-5602-EC2A96DCACCE}"/>
               </a:ext>
             </a:extLst>
           </p:cNvPr>
@@ -5537,24 +6184,25 @@
             <p:ph idx="1"/>
           </p:nvPr>
         </p:nvPicPr>
-        <p:blipFill rotWithShape="1">
+        <p:blipFill>
           <a:blip r:embed="rId2"/>
-          <a:srcRect l="11329" t="36586" r="68141" b="22512"/>
-          <a:stretch/>
+          <a:stretch>
+            <a:fillRect/>
+          </a:stretch>
         </p:blipFill>
         <p:spPr>
           <a:xfrm>
-            <a:off x="1070311" y="3543613"/>
-            <a:ext cx="3150028" cy="1765101"/>
+            <a:off x="1743518" y="3243987"/>
+            <a:ext cx="2643415" cy="2245828"/>
           </a:xfrm>
         </p:spPr>
       </p:pic>
       <p:pic>
         <p:nvPicPr>
-          <p:cNvPr id="4" name="Picture 3" descr="A picture containing icon&#10;&#10;Description automatically generated">
+          <p:cNvPr id="8" name="Content Placeholder 10" descr="A picture containing chart&#10;&#10;Description automatically generated">
             <a:extLst>
               <a:ext uri="{FF2B5EF4-FFF2-40B4-BE49-F238E27FC236}">
-                <a16:creationId xmlns:a16="http://schemas.microsoft.com/office/drawing/2014/main" id="{95AAC92E-73C1-0383-9FEE-F6EC21B9D1B5}"/>
+                <a16:creationId xmlns:a16="http://schemas.microsoft.com/office/drawing/2014/main" id="{80F8FCCE-74D6-96A6-D790-CD345308F445}"/>
               </a:ext>
             </a:extLst>
           </p:cNvPr>
@@ -5563,25 +6211,198 @@
           </p:cNvPicPr>
           <p:nvPr/>
         </p:nvPicPr>
-        <p:blipFill rotWithShape="1">
+        <p:blipFill>
           <a:blip r:embed="rId3"/>
-          <a:srcRect l="13588" t="28591" r="13684" b="25634"/>
-          <a:stretch/>
+          <a:stretch>
+            <a:fillRect/>
+          </a:stretch>
         </p:blipFill>
         <p:spPr>
           <a:xfrm>
-            <a:off x="4923663" y="3543614"/>
-            <a:ext cx="3150026" cy="1765100"/>
+            <a:off x="5146431" y="3088250"/>
+            <a:ext cx="2257691" cy="2401564"/>
           </a:xfrm>
           <a:prstGeom prst="rect">
             <a:avLst/>
           </a:prstGeom>
+        </p:spPr>
+      </p:pic>
+      <p:sp>
+        <p:nvSpPr>
+          <p:cNvPr id="9" name="TextBox 8">
+            <a:extLst>
+              <a:ext uri="{FF2B5EF4-FFF2-40B4-BE49-F238E27FC236}">
+                <a16:creationId xmlns:a16="http://schemas.microsoft.com/office/drawing/2014/main" id="{A5FF6EC9-CC0A-9379-8277-FBC79A96C527}"/>
+              </a:ext>
+            </a:extLst>
+          </p:cNvPr>
+          <p:cNvSpPr txBox="1"/>
+          <p:nvPr/>
+        </p:nvSpPr>
+        <p:spPr>
+          <a:xfrm>
+            <a:off x="2163558" y="5841016"/>
+            <a:ext cx="1779287" cy="369332"/>
+          </a:xfrm>
+          <a:prstGeom prst="rect">
+            <a:avLst/>
+          </a:prstGeom>
+          <a:noFill/>
+        </p:spPr>
+        <p:txBody>
+          <a:bodyPr wrap="square" rtlCol="0">
+            <a:spAutoFit/>
+          </a:bodyPr>
+          <a:lstStyle/>
+          <a:p>
+            <a:pPr algn="ctr"/>
+            <a:r>
+              <a:rPr lang="en-BE" dirty="0">
+                <a:latin typeface="Times New Roman" panose="02020603050405020304" pitchFamily="18" charset="0"/>
+                <a:cs typeface="Times New Roman" panose="02020603050405020304" pitchFamily="18" charset="0"/>
+              </a:rPr>
+              <a:t>Amount circle</a:t>
+            </a:r>
+          </a:p>
+        </p:txBody>
+      </p:sp>
+      <p:sp>
+        <p:nvSpPr>
+          <p:cNvPr id="10" name="TextBox 9">
+            <a:extLst>
+              <a:ext uri="{FF2B5EF4-FFF2-40B4-BE49-F238E27FC236}">
+                <a16:creationId xmlns:a16="http://schemas.microsoft.com/office/drawing/2014/main" id="{52F073B9-ECAA-B686-4C5A-4FA97DB43D45}"/>
+              </a:ext>
+            </a:extLst>
+          </p:cNvPr>
+          <p:cNvSpPr txBox="1"/>
+          <p:nvPr/>
+        </p:nvSpPr>
+        <p:spPr>
+          <a:xfrm>
+            <a:off x="5360902" y="5841016"/>
+            <a:ext cx="1779287" cy="369332"/>
+          </a:xfrm>
+          <a:prstGeom prst="rect">
+            <a:avLst/>
+          </a:prstGeom>
+          <a:noFill/>
+        </p:spPr>
+        <p:txBody>
+          <a:bodyPr wrap="square" rtlCol="0">
+            <a:spAutoFit/>
+          </a:bodyPr>
+          <a:lstStyle/>
+          <a:p>
+            <a:pPr algn="ctr"/>
+            <a:r>
+              <a:rPr lang="en-BE" dirty="0">
+                <a:latin typeface="Times New Roman" panose="02020603050405020304" pitchFamily="18" charset="0"/>
+                <a:cs typeface="Times New Roman" panose="02020603050405020304" pitchFamily="18" charset="0"/>
+              </a:rPr>
+              <a:t>Probability circle</a:t>
+            </a:r>
+          </a:p>
+        </p:txBody>
+      </p:sp>
+      <p:pic>
+        <p:nvPicPr>
+          <p:cNvPr id="11" name="Picture 2" descr="Ever wonder why your mouse cursor is slanted? | by ajiitha | Prototypr">
+            <a:extLst>
+              <a:ext uri="{FF2B5EF4-FFF2-40B4-BE49-F238E27FC236}">
+                <a16:creationId xmlns:a16="http://schemas.microsoft.com/office/drawing/2014/main" id="{5B0EEA75-4940-274A-6CE5-0C5C33D709D4}"/>
+              </a:ext>
+            </a:extLst>
+          </p:cNvPr>
+          <p:cNvPicPr>
+            <a:picLocks noChangeAspect="1" noChangeArrowheads="1"/>
+          </p:cNvPicPr>
+          <p:nvPr/>
+        </p:nvPicPr>
+        <p:blipFill>
+          <a:blip r:embed="rId4">
+            <a:extLst>
+              <a:ext uri="{28A0092B-C50C-407E-A947-70E740481C1C}">
+                <a14:useLocalDpi xmlns:a14="http://schemas.microsoft.com/office/drawing/2010/main" val="0"/>
+              </a:ext>
+            </a:extLst>
+          </a:blip>
+          <a:srcRect/>
+          <a:stretch>
+            <a:fillRect/>
+          </a:stretch>
+        </p:blipFill>
+        <p:spPr bwMode="auto">
+          <a:xfrm>
+            <a:off x="6702476" y="4961937"/>
+            <a:ext cx="247123" cy="353033"/>
+          </a:xfrm>
+          <a:prstGeom prst="rect">
+            <a:avLst/>
+          </a:prstGeom>
+          <a:noFill/>
+          <a:extLst>
+            <a:ext uri="{909E8E84-426E-40DD-AFC4-6F175D3DCCD1}">
+              <a14:hiddenFill xmlns:a14="http://schemas.microsoft.com/office/drawing/2010/main">
+                <a:solidFill>
+                  <a:srgbClr val="FFFFFF"/>
+                </a:solidFill>
+              </a14:hiddenFill>
+            </a:ext>
+          </a:extLst>
+        </p:spPr>
+      </p:pic>
+      <p:pic>
+        <p:nvPicPr>
+          <p:cNvPr id="12" name="Picture 2" descr="Ever wonder why your mouse cursor is slanted? | by ajiitha | Prototypr">
+            <a:extLst>
+              <a:ext uri="{FF2B5EF4-FFF2-40B4-BE49-F238E27FC236}">
+                <a16:creationId xmlns:a16="http://schemas.microsoft.com/office/drawing/2014/main" id="{1F8EF8A8-6721-6E56-0553-080CD118F8EF}"/>
+              </a:ext>
+            </a:extLst>
+          </p:cNvPr>
+          <p:cNvPicPr>
+            <a:picLocks noChangeAspect="1" noChangeArrowheads="1"/>
+          </p:cNvPicPr>
+          <p:nvPr/>
+        </p:nvPicPr>
+        <p:blipFill>
+          <a:blip r:embed="rId4">
+            <a:extLst>
+              <a:ext uri="{28A0092B-C50C-407E-A947-70E740481C1C}">
+                <a14:useLocalDpi xmlns:a14="http://schemas.microsoft.com/office/drawing/2010/main" val="0"/>
+              </a:ext>
+            </a:extLst>
+          </a:blip>
+          <a:srcRect/>
+          <a:stretch>
+            <a:fillRect/>
+          </a:stretch>
+        </p:blipFill>
+        <p:spPr bwMode="auto">
+          <a:xfrm>
+            <a:off x="3595858" y="4780508"/>
+            <a:ext cx="247123" cy="353033"/>
+          </a:xfrm>
+          <a:prstGeom prst="rect">
+            <a:avLst/>
+          </a:prstGeom>
+          <a:noFill/>
+          <a:extLst>
+            <a:ext uri="{909E8E84-426E-40DD-AFC4-6F175D3DCCD1}">
+              <a14:hiddenFill xmlns:a14="http://schemas.microsoft.com/office/drawing/2010/main">
+                <a:solidFill>
+                  <a:srgbClr val="FFFFFF"/>
+                </a:solidFill>
+              </a14:hiddenFill>
+            </a:ext>
+          </a:extLst>
         </p:spPr>
       </p:pic>
     </p:spTree>
     <p:extLst>
       <p:ext uri="{BB962C8B-B14F-4D97-AF65-F5344CB8AC3E}">
-        <p14:creationId xmlns:p14="http://schemas.microsoft.com/office/powerpoint/2010/main" val="3236447987"/>
+        <p14:creationId xmlns:p14="http://schemas.microsoft.com/office/powerpoint/2010/main" val="3077944708"/>
       </p:ext>
     </p:extLst>
   </p:cSld>
@@ -5610,10 +6431,10 @@
       </p:grpSpPr>
       <p:sp>
         <p:nvSpPr>
-          <p:cNvPr id="2" name="TextBox 1">
+          <p:cNvPr id="4" name="TextBox 3">
             <a:extLst>
               <a:ext uri="{FF2B5EF4-FFF2-40B4-BE49-F238E27FC236}">
-                <a16:creationId xmlns:a16="http://schemas.microsoft.com/office/drawing/2014/main" id="{0C5C16C7-26D5-0D89-8C19-AFF8A902A2EA}"/>
+                <a16:creationId xmlns:a16="http://schemas.microsoft.com/office/drawing/2014/main" id="{488853E7-71EB-9638-27FC-1F1BE5858164}"/>
               </a:ext>
             </a:extLst>
           </p:cNvPr>
@@ -5622,8 +6443,8 @@
         </p:nvSpPr>
         <p:spPr>
           <a:xfrm>
-            <a:off x="537426" y="2298823"/>
-            <a:ext cx="8085762" cy="1477328"/>
+            <a:off x="529119" y="464976"/>
+            <a:ext cx="8085762" cy="1754326"/>
           </a:xfrm>
           <a:prstGeom prst="rect">
             <a:avLst/>
@@ -5642,21 +6463,21 @@
                 <a:latin typeface="Times New Roman" panose="02020603050405020304" pitchFamily="18" charset="0"/>
                 <a:cs typeface="Times New Roman" panose="02020603050405020304" pitchFamily="18" charset="0"/>
               </a:rPr>
-              <a:t>If there is anything unclear about the rules, you can go back to the previous (by pressing </a:t>
-            </a:r>
-            <a:r>
-              <a:rPr lang="en-US">
-                <a:latin typeface="Times New Roman" panose="02020603050405020304" pitchFamily="18" charset="0"/>
-                <a:cs typeface="Times New Roman" panose="02020603050405020304" pitchFamily="18" charset="0"/>
-              </a:rPr>
-              <a:t>the previous </a:t>
+              <a:t>You need to decide which option you want to choose. To choose an option, </a:t>
+            </a:r>
+            <a:r>
+              <a:rPr lang="en-US" b="1" dirty="0">
+                <a:latin typeface="Times New Roman" panose="02020603050405020304" pitchFamily="18" charset="0"/>
+                <a:cs typeface="Times New Roman" panose="02020603050405020304" pitchFamily="18" charset="0"/>
+              </a:rPr>
+              <a:t>click on one of the buttons </a:t>
             </a:r>
             <a:r>
               <a:rPr lang="en-US" dirty="0">
                 <a:latin typeface="Times New Roman" panose="02020603050405020304" pitchFamily="18" charset="0"/>
                 <a:cs typeface="Times New Roman" panose="02020603050405020304" pitchFamily="18" charset="0"/>
               </a:rPr>
-              <a:t>button below) pages and read them again.</a:t>
+              <a:t>in the middle of the screen (click on the blue button to select the blue option, and the yellow button to select the yellow option). </a:t>
             </a:r>
           </a:p>
           <a:p>
@@ -5673,15 +6494,113 @@
                 <a:latin typeface="Times New Roman" panose="02020603050405020304" pitchFamily="18" charset="0"/>
                 <a:cs typeface="Times New Roman" panose="02020603050405020304" pitchFamily="18" charset="0"/>
               </a:rPr>
-              <a:t>You will first get 6 trials to get familiar with the task. The results from these practice trials do not count.</a:t>
-            </a:r>
-          </a:p>
-        </p:txBody>
-      </p:sp>
+              <a:t>Suppose in this example you choose the yellow option. You click on the yellow button (see below).</a:t>
+            </a:r>
+          </a:p>
+        </p:txBody>
+      </p:sp>
+      <p:grpSp>
+        <p:nvGrpSpPr>
+          <p:cNvPr id="7" name="Group 6">
+            <a:extLst>
+              <a:ext uri="{FF2B5EF4-FFF2-40B4-BE49-F238E27FC236}">
+                <a16:creationId xmlns:a16="http://schemas.microsoft.com/office/drawing/2014/main" id="{C849E291-70F9-987A-F53B-83A372D3CC12}"/>
+              </a:ext>
+            </a:extLst>
+          </p:cNvPr>
+          <p:cNvGrpSpPr/>
+          <p:nvPr/>
+        </p:nvGrpSpPr>
+        <p:grpSpPr>
+          <a:xfrm>
+            <a:off x="2610777" y="2927221"/>
+            <a:ext cx="3922446" cy="3225592"/>
+            <a:chOff x="2610774" y="981190"/>
+            <a:chExt cx="3922446" cy="3225592"/>
+          </a:xfrm>
+        </p:grpSpPr>
+        <p:pic>
+          <p:nvPicPr>
+            <p:cNvPr id="6" name="Picture 5" descr="A picture containing diagram&#10;&#10;Description automatically generated">
+              <a:extLst>
+                <a:ext uri="{FF2B5EF4-FFF2-40B4-BE49-F238E27FC236}">
+                  <a16:creationId xmlns:a16="http://schemas.microsoft.com/office/drawing/2014/main" id="{602CC854-8008-8C71-5A2B-99C0E9A36DB7}"/>
+                </a:ext>
+              </a:extLst>
+            </p:cNvPr>
+            <p:cNvPicPr>
+              <a:picLocks noChangeAspect="1"/>
+            </p:cNvPicPr>
+            <p:nvPr/>
+          </p:nvPicPr>
+          <p:blipFill>
+            <a:blip r:embed="rId2"/>
+            <a:stretch>
+              <a:fillRect/>
+            </a:stretch>
+          </p:blipFill>
+          <p:spPr>
+            <a:xfrm>
+              <a:off x="2610774" y="981190"/>
+              <a:ext cx="3922446" cy="3225592"/>
+            </a:xfrm>
+            <a:prstGeom prst="rect">
+              <a:avLst/>
+            </a:prstGeom>
+          </p:spPr>
+        </p:pic>
+        <p:pic>
+          <p:nvPicPr>
+            <p:cNvPr id="3" name="Picture 6" descr="Free Click Icon, Symbol. PNG, SVG Download.">
+              <a:extLst>
+                <a:ext uri="{FF2B5EF4-FFF2-40B4-BE49-F238E27FC236}">
+                  <a16:creationId xmlns:a16="http://schemas.microsoft.com/office/drawing/2014/main" id="{062FD9BF-3B9A-AAF9-66A0-AF28DDA815C7}"/>
+                </a:ext>
+              </a:extLst>
+            </p:cNvPr>
+            <p:cNvPicPr>
+              <a:picLocks noChangeAspect="1" noChangeArrowheads="1"/>
+            </p:cNvPicPr>
+            <p:nvPr/>
+          </p:nvPicPr>
+          <p:blipFill>
+            <a:blip r:embed="rId3">
+              <a:extLst>
+                <a:ext uri="{28A0092B-C50C-407E-A947-70E740481C1C}">
+                  <a14:useLocalDpi xmlns:a14="http://schemas.microsoft.com/office/drawing/2010/main" val="0"/>
+                </a:ext>
+              </a:extLst>
+            </a:blip>
+            <a:srcRect/>
+            <a:stretch>
+              <a:fillRect/>
+            </a:stretch>
+          </p:blipFill>
+          <p:spPr bwMode="auto">
+            <a:xfrm rot="19638701">
+              <a:off x="4670738" y="2436181"/>
+              <a:ext cx="517385" cy="517385"/>
+            </a:xfrm>
+            <a:prstGeom prst="rect">
+              <a:avLst/>
+            </a:prstGeom>
+            <a:noFill/>
+            <a:extLst>
+              <a:ext uri="{909E8E84-426E-40DD-AFC4-6F175D3DCCD1}">
+                <a14:hiddenFill xmlns:a14="http://schemas.microsoft.com/office/drawing/2010/main">
+                  <a:solidFill>
+                    <a:srgbClr val="FFFFFF"/>
+                  </a:solidFill>
+                </a14:hiddenFill>
+              </a:ext>
+            </a:extLst>
+          </p:spPr>
+        </p:pic>
+      </p:grpSp>
     </p:spTree>
     <p:extLst>
       <p:ext uri="{BB962C8B-B14F-4D97-AF65-F5344CB8AC3E}">
-        <p14:creationId xmlns:p14="http://schemas.microsoft.com/office/powerpoint/2010/main" val="904502395"/>
+        <p14:creationId xmlns:p14="http://schemas.microsoft.com/office/powerpoint/2010/main" val="2871051257"/>
       </p:ext>
     </p:extLst>
   </p:cSld>

</xml_diff>

<commit_message>
Modify code for data recording
</commit_message>
<xml_diff>
--- a/gain-only-pilot/code/experiment/Instructions.pptx
+++ b/gain-only-pilot/code/experiment/Instructions.pptx
@@ -4444,21 +4444,21 @@
                 <a:latin typeface="Times New Roman" panose="02020603050405020304" pitchFamily="18" charset="0"/>
                 <a:cs typeface="Times New Roman" panose="02020603050405020304" pitchFamily="18" charset="0"/>
               </a:rPr>
-              <a:t>That was the practice. The rules for the real task are the same. You will now </a:t>
-            </a:r>
-            <a:r>
-              <a:rPr lang="en-US">
-                <a:latin typeface="Times New Roman" panose="02020603050405020304" pitchFamily="18" charset="0"/>
-                <a:cs typeface="Times New Roman" panose="02020603050405020304" pitchFamily="18" charset="0"/>
-              </a:rPr>
-              <a:t>play 90 </a:t>
+              <a:t>That was the practice. The rules for the real task are the same. You will now play 90 trials in total. At the end of the experiment, the program </a:t>
+            </a:r>
+            <a:r>
+              <a:rPr lang="en-US" b="1" dirty="0">
+                <a:latin typeface="Times New Roman" panose="02020603050405020304" pitchFamily="18" charset="0"/>
+                <a:cs typeface="Times New Roman" panose="02020603050405020304" pitchFamily="18" charset="0"/>
+              </a:rPr>
+              <a:t>will randomly pick 5 trials</a:t>
             </a:r>
             <a:r>
               <a:rPr lang="en-US" dirty="0">
                 <a:latin typeface="Times New Roman" panose="02020603050405020304" pitchFamily="18" charset="0"/>
                 <a:cs typeface="Times New Roman" panose="02020603050405020304" pitchFamily="18" charset="0"/>
               </a:rPr>
-              <a:t>trials in total. At the end of the experiment, the program will randomly pick 10 trials, and add up the money on these 10 trials. You can win a maximum of 1 British pound as bonus. In case your total is 0 or negative, you will not get any bonus.</a:t>
+              <a:t>, and add up the money on these 5 trials. You can win a maximum of 1 British pound as bonus. In case your total is 0, you will not get any bonus.</a:t>
             </a:r>
           </a:p>
           <a:p>

</xml_diff>